<commit_message>
Parte di Analisi del Problema nella presentazione
</commit_message>
<xml_diff>
--- a/Documentazione/PresentazioneShareMyHouse.pptx
+++ b/Documentazione/PresentazioneShareMyHouse.pptx
@@ -1,13 +1,32 @@
 
 <file path=ppt/presentation.xml><?xml version="1.0" encoding="utf-8"?>
-<p:presentation xmlns:a="http://schemas.openxmlformats.org/drawingml/2006/main" xmlns:r="http://schemas.openxmlformats.org/officeDocument/2006/relationships" xmlns:p="http://schemas.openxmlformats.org/presentationml/2006/main" saveSubsetFonts="1" autoCompressPictures="0">
+<p:presentation xmlns:a="http://schemas.openxmlformats.org/drawingml/2006/main" xmlns:r="http://schemas.openxmlformats.org/officeDocument/2006/relationships" xmlns:p="http://schemas.openxmlformats.org/presentationml/2006/main" showSpecialPlsOnTitleSld="0" saveSubsetFonts="1" autoCompressPictures="0">
   <p:sldMasterIdLst>
     <p:sldMasterId id="2147483660" r:id="rId1"/>
   </p:sldMasterIdLst>
+  <p:notesMasterIdLst>
+    <p:notesMasterId r:id="rId21"/>
+  </p:notesMasterIdLst>
   <p:sldIdLst>
     <p:sldId id="256" r:id="rId2"/>
     <p:sldId id="257" r:id="rId3"/>
     <p:sldId id="258" r:id="rId4"/>
+    <p:sldId id="259" r:id="rId5"/>
+    <p:sldId id="260" r:id="rId6"/>
+    <p:sldId id="261" r:id="rId7"/>
+    <p:sldId id="262" r:id="rId8"/>
+    <p:sldId id="263" r:id="rId9"/>
+    <p:sldId id="264" r:id="rId10"/>
+    <p:sldId id="265" r:id="rId11"/>
+    <p:sldId id="266" r:id="rId12"/>
+    <p:sldId id="267" r:id="rId13"/>
+    <p:sldId id="268" r:id="rId14"/>
+    <p:sldId id="269" r:id="rId15"/>
+    <p:sldId id="270" r:id="rId16"/>
+    <p:sldId id="271" r:id="rId17"/>
+    <p:sldId id="272" r:id="rId18"/>
+    <p:sldId id="273" r:id="rId19"/>
+    <p:sldId id="274" r:id="rId20"/>
   </p:sldIdLst>
   <p:sldSz cx="9144000" cy="6858000" type="screen4x3"/>
   <p:notesSz cx="6858000" cy="9144000"/>
@@ -106,7 +125,361 @@
       </a:defRPr>
     </a:lvl9pPr>
   </p:defaultTextStyle>
+  <p:extLst>
+    <p:ext uri="{EFAFB233-063F-42B5-8137-9DF3F51BA10A}">
+      <p15:sldGuideLst xmlns:p15="http://schemas.microsoft.com/office/powerpoint/2012/main"/>
+    </p:ext>
+  </p:extLst>
 </p:presentation>
+</file>
+
+<file path=ppt/notesMasters/notesMaster1.xml><?xml version="1.0" encoding="utf-8"?>
+<p:notesMaster xmlns:a="http://schemas.openxmlformats.org/drawingml/2006/main" xmlns:r="http://schemas.openxmlformats.org/officeDocument/2006/relationships" xmlns:p="http://schemas.openxmlformats.org/presentationml/2006/main">
+  <p:cSld>
+    <p:bg>
+      <p:bgRef idx="1001">
+        <a:schemeClr val="bg1"/>
+      </p:bgRef>
+    </p:bg>
+    <p:spTree>
+      <p:nvGrpSpPr>
+        <p:cNvPr id="1" name=""/>
+        <p:cNvGrpSpPr/>
+        <p:nvPr/>
+      </p:nvGrpSpPr>
+      <p:grpSpPr>
+        <a:xfrm>
+          <a:off x="0" y="0"/>
+          <a:ext cx="0" cy="0"/>
+          <a:chOff x="0" y="0"/>
+          <a:chExt cx="0" cy="0"/>
+        </a:xfrm>
+      </p:grpSpPr>
+      <p:sp>
+        <p:nvSpPr>
+          <p:cNvPr id="2" name="Segnaposto intestazione 1"/>
+          <p:cNvSpPr>
+            <a:spLocks noGrp="1"/>
+          </p:cNvSpPr>
+          <p:nvPr>
+            <p:ph type="hdr" sz="quarter"/>
+          </p:nvPr>
+        </p:nvSpPr>
+        <p:spPr>
+          <a:xfrm>
+            <a:off x="0" y="0"/>
+            <a:ext cx="2971800" cy="458788"/>
+          </a:xfrm>
+          <a:prstGeom prst="rect">
+            <a:avLst/>
+          </a:prstGeom>
+        </p:spPr>
+        <p:txBody>
+          <a:bodyPr vert="horz" lIns="91440" tIns="45720" rIns="91440" bIns="45720" rtlCol="0"/>
+          <a:lstStyle>
+            <a:lvl1pPr algn="l">
+              <a:defRPr sz="1200"/>
+            </a:lvl1pPr>
+          </a:lstStyle>
+          <a:p>
+            <a:endParaRPr lang="it-IT"/>
+          </a:p>
+        </p:txBody>
+      </p:sp>
+      <p:sp>
+        <p:nvSpPr>
+          <p:cNvPr id="3" name="Segnaposto data 2"/>
+          <p:cNvSpPr>
+            <a:spLocks noGrp="1"/>
+          </p:cNvSpPr>
+          <p:nvPr>
+            <p:ph type="dt" idx="1"/>
+          </p:nvPr>
+        </p:nvSpPr>
+        <p:spPr>
+          <a:xfrm>
+            <a:off x="3884613" y="0"/>
+            <a:ext cx="2971800" cy="458788"/>
+          </a:xfrm>
+          <a:prstGeom prst="rect">
+            <a:avLst/>
+          </a:prstGeom>
+        </p:spPr>
+        <p:txBody>
+          <a:bodyPr vert="horz" lIns="91440" tIns="45720" rIns="91440" bIns="45720" rtlCol="0"/>
+          <a:lstStyle>
+            <a:lvl1pPr algn="r">
+              <a:defRPr sz="1200"/>
+            </a:lvl1pPr>
+          </a:lstStyle>
+          <a:p>
+            <a:fld id="{96D89BA8-EE5F-A848-B587-7E43E9FF5C43}" type="datetimeFigureOut">
+              <a:rPr lang="it-IT" smtClean="0"/>
+              <a:t>15/05/19</a:t>
+            </a:fld>
+            <a:endParaRPr lang="it-IT"/>
+          </a:p>
+        </p:txBody>
+      </p:sp>
+      <p:sp>
+        <p:nvSpPr>
+          <p:cNvPr id="4" name="Segnaposto immagine diapositiva 3"/>
+          <p:cNvSpPr>
+            <a:spLocks noGrp="1" noRot="1" noChangeAspect="1"/>
+          </p:cNvSpPr>
+          <p:nvPr>
+            <p:ph type="sldImg" idx="2"/>
+          </p:nvPr>
+        </p:nvSpPr>
+        <p:spPr>
+          <a:xfrm>
+            <a:off x="1371600" y="1143000"/>
+            <a:ext cx="4114800" cy="3086100"/>
+          </a:xfrm>
+          <a:prstGeom prst="rect">
+            <a:avLst/>
+          </a:prstGeom>
+          <a:noFill/>
+          <a:ln w="12700">
+            <a:solidFill>
+              <a:prstClr val="black"/>
+            </a:solidFill>
+          </a:ln>
+        </p:spPr>
+        <p:txBody>
+          <a:bodyPr vert="horz" lIns="91440" tIns="45720" rIns="91440" bIns="45720" rtlCol="0" anchor="ctr"/>
+          <a:lstStyle/>
+          <a:p>
+            <a:endParaRPr lang="it-IT"/>
+          </a:p>
+        </p:txBody>
+      </p:sp>
+      <p:sp>
+        <p:nvSpPr>
+          <p:cNvPr id="5" name="Segnaposto note 4"/>
+          <p:cNvSpPr>
+            <a:spLocks noGrp="1"/>
+          </p:cNvSpPr>
+          <p:nvPr>
+            <p:ph type="body" sz="quarter" idx="3"/>
+          </p:nvPr>
+        </p:nvSpPr>
+        <p:spPr>
+          <a:xfrm>
+            <a:off x="685800" y="4400550"/>
+            <a:ext cx="5486400" cy="3600450"/>
+          </a:xfrm>
+          <a:prstGeom prst="rect">
+            <a:avLst/>
+          </a:prstGeom>
+        </p:spPr>
+        <p:txBody>
+          <a:bodyPr vert="horz" lIns="91440" tIns="45720" rIns="91440" bIns="45720" rtlCol="0"/>
+          <a:lstStyle/>
+          <a:p>
+            <a:pPr lvl="0"/>
+            <a:r>
+              <a:rPr lang="it-IT"/>
+              <a:t>Fare clic per modificare gli stili del testo dello schema</a:t>
+            </a:r>
+          </a:p>
+          <a:p>
+            <a:pPr lvl="1"/>
+            <a:r>
+              <a:rPr lang="it-IT"/>
+              <a:t>Secondo livello</a:t>
+            </a:r>
+          </a:p>
+          <a:p>
+            <a:pPr lvl="2"/>
+            <a:r>
+              <a:rPr lang="it-IT"/>
+              <a:t>Terzo livello</a:t>
+            </a:r>
+          </a:p>
+          <a:p>
+            <a:pPr lvl="3"/>
+            <a:r>
+              <a:rPr lang="it-IT"/>
+              <a:t>Quarto livello</a:t>
+            </a:r>
+          </a:p>
+          <a:p>
+            <a:pPr lvl="4"/>
+            <a:r>
+              <a:rPr lang="it-IT"/>
+              <a:t>Quinto livello</a:t>
+            </a:r>
+          </a:p>
+        </p:txBody>
+      </p:sp>
+      <p:sp>
+        <p:nvSpPr>
+          <p:cNvPr id="6" name="Segnaposto piè di pagina 5"/>
+          <p:cNvSpPr>
+            <a:spLocks noGrp="1"/>
+          </p:cNvSpPr>
+          <p:nvPr>
+            <p:ph type="ftr" sz="quarter" idx="4"/>
+          </p:nvPr>
+        </p:nvSpPr>
+        <p:spPr>
+          <a:xfrm>
+            <a:off x="0" y="8685213"/>
+            <a:ext cx="2971800" cy="458787"/>
+          </a:xfrm>
+          <a:prstGeom prst="rect">
+            <a:avLst/>
+          </a:prstGeom>
+        </p:spPr>
+        <p:txBody>
+          <a:bodyPr vert="horz" lIns="91440" tIns="45720" rIns="91440" bIns="45720" rtlCol="0" anchor="b"/>
+          <a:lstStyle>
+            <a:lvl1pPr algn="l">
+              <a:defRPr sz="1200"/>
+            </a:lvl1pPr>
+          </a:lstStyle>
+          <a:p>
+            <a:endParaRPr lang="it-IT"/>
+          </a:p>
+        </p:txBody>
+      </p:sp>
+      <p:sp>
+        <p:nvSpPr>
+          <p:cNvPr id="7" name="Segnaposto numero diapositiva 6"/>
+          <p:cNvSpPr>
+            <a:spLocks noGrp="1"/>
+          </p:cNvSpPr>
+          <p:nvPr>
+            <p:ph type="sldNum" sz="quarter" idx="5"/>
+          </p:nvPr>
+        </p:nvSpPr>
+        <p:spPr>
+          <a:xfrm>
+            <a:off x="3884613" y="8685213"/>
+            <a:ext cx="2971800" cy="458787"/>
+          </a:xfrm>
+          <a:prstGeom prst="rect">
+            <a:avLst/>
+          </a:prstGeom>
+        </p:spPr>
+        <p:txBody>
+          <a:bodyPr vert="horz" lIns="91440" tIns="45720" rIns="91440" bIns="45720" rtlCol="0" anchor="b"/>
+          <a:lstStyle>
+            <a:lvl1pPr algn="r">
+              <a:defRPr sz="1200"/>
+            </a:lvl1pPr>
+          </a:lstStyle>
+          <a:p>
+            <a:fld id="{1186988E-6D4A-1349-85EA-6B34906E3431}" type="slidenum">
+              <a:rPr lang="it-IT" smtClean="0"/>
+              <a:t>‹N›</a:t>
+            </a:fld>
+            <a:endParaRPr lang="it-IT"/>
+          </a:p>
+        </p:txBody>
+      </p:sp>
+    </p:spTree>
+    <p:extLst>
+      <p:ext uri="{BB962C8B-B14F-4D97-AF65-F5344CB8AC3E}">
+        <p14:creationId xmlns:p14="http://schemas.microsoft.com/office/powerpoint/2010/main" val="3612191537"/>
+      </p:ext>
+    </p:extLst>
+  </p:cSld>
+  <p:clrMap bg1="lt1" tx1="dk1" bg2="lt2" tx2="dk2" accent1="accent1" accent2="accent2" accent3="accent3" accent4="accent4" accent5="accent5" accent6="accent6" hlink="hlink" folHlink="folHlink"/>
+  <p:notesStyle>
+    <a:lvl1pPr marL="0" algn="l" defTabSz="914400" rtl="0" eaLnBrk="1" latinLnBrk="0" hangingPunct="1">
+      <a:defRPr sz="1200" kern="1200">
+        <a:solidFill>
+          <a:schemeClr val="tx1"/>
+        </a:solidFill>
+        <a:latin typeface="+mn-lt"/>
+        <a:ea typeface="+mn-ea"/>
+        <a:cs typeface="+mn-cs"/>
+      </a:defRPr>
+    </a:lvl1pPr>
+    <a:lvl2pPr marL="457200" algn="l" defTabSz="914400" rtl="0" eaLnBrk="1" latinLnBrk="0" hangingPunct="1">
+      <a:defRPr sz="1200" kern="1200">
+        <a:solidFill>
+          <a:schemeClr val="tx1"/>
+        </a:solidFill>
+        <a:latin typeface="+mn-lt"/>
+        <a:ea typeface="+mn-ea"/>
+        <a:cs typeface="+mn-cs"/>
+      </a:defRPr>
+    </a:lvl2pPr>
+    <a:lvl3pPr marL="914400" algn="l" defTabSz="914400" rtl="0" eaLnBrk="1" latinLnBrk="0" hangingPunct="1">
+      <a:defRPr sz="1200" kern="1200">
+        <a:solidFill>
+          <a:schemeClr val="tx1"/>
+        </a:solidFill>
+        <a:latin typeface="+mn-lt"/>
+        <a:ea typeface="+mn-ea"/>
+        <a:cs typeface="+mn-cs"/>
+      </a:defRPr>
+    </a:lvl3pPr>
+    <a:lvl4pPr marL="1371600" algn="l" defTabSz="914400" rtl="0" eaLnBrk="1" latinLnBrk="0" hangingPunct="1">
+      <a:defRPr sz="1200" kern="1200">
+        <a:solidFill>
+          <a:schemeClr val="tx1"/>
+        </a:solidFill>
+        <a:latin typeface="+mn-lt"/>
+        <a:ea typeface="+mn-ea"/>
+        <a:cs typeface="+mn-cs"/>
+      </a:defRPr>
+    </a:lvl4pPr>
+    <a:lvl5pPr marL="1828800" algn="l" defTabSz="914400" rtl="0" eaLnBrk="1" latinLnBrk="0" hangingPunct="1">
+      <a:defRPr sz="1200" kern="1200">
+        <a:solidFill>
+          <a:schemeClr val="tx1"/>
+        </a:solidFill>
+        <a:latin typeface="+mn-lt"/>
+        <a:ea typeface="+mn-ea"/>
+        <a:cs typeface="+mn-cs"/>
+      </a:defRPr>
+    </a:lvl5pPr>
+    <a:lvl6pPr marL="2286000" algn="l" defTabSz="914400" rtl="0" eaLnBrk="1" latinLnBrk="0" hangingPunct="1">
+      <a:defRPr sz="1200" kern="1200">
+        <a:solidFill>
+          <a:schemeClr val="tx1"/>
+        </a:solidFill>
+        <a:latin typeface="+mn-lt"/>
+        <a:ea typeface="+mn-ea"/>
+        <a:cs typeface="+mn-cs"/>
+      </a:defRPr>
+    </a:lvl6pPr>
+    <a:lvl7pPr marL="2743200" algn="l" defTabSz="914400" rtl="0" eaLnBrk="1" latinLnBrk="0" hangingPunct="1">
+      <a:defRPr sz="1200" kern="1200">
+        <a:solidFill>
+          <a:schemeClr val="tx1"/>
+        </a:solidFill>
+        <a:latin typeface="+mn-lt"/>
+        <a:ea typeface="+mn-ea"/>
+        <a:cs typeface="+mn-cs"/>
+      </a:defRPr>
+    </a:lvl7pPr>
+    <a:lvl8pPr marL="3200400" algn="l" defTabSz="914400" rtl="0" eaLnBrk="1" latinLnBrk="0" hangingPunct="1">
+      <a:defRPr sz="1200" kern="1200">
+        <a:solidFill>
+          <a:schemeClr val="tx1"/>
+        </a:solidFill>
+        <a:latin typeface="+mn-lt"/>
+        <a:ea typeface="+mn-ea"/>
+        <a:cs typeface="+mn-cs"/>
+      </a:defRPr>
+    </a:lvl8pPr>
+    <a:lvl9pPr marL="3657600" algn="l" defTabSz="914400" rtl="0" eaLnBrk="1" latinLnBrk="0" hangingPunct="1">
+      <a:defRPr sz="1200" kern="1200">
+        <a:solidFill>
+          <a:schemeClr val="tx1"/>
+        </a:solidFill>
+        <a:latin typeface="+mn-lt"/>
+        <a:ea typeface="+mn-ea"/>
+        <a:cs typeface="+mn-cs"/>
+      </a:defRPr>
+    </a:lvl9pPr>
+  </p:notesStyle>
+</p:notesMaster>
 </file>
 
 <file path=ppt/slideLayouts/slideLayout1.xml><?xml version="1.0" encoding="utf-8"?>
@@ -238,9 +611,9 @@
           <a:bodyPr/>
           <a:lstStyle/>
           <a:p>
-            <a:fld id="{C2430E77-6B1C-0540-83ED-E7236D778B0E}" type="datetimeFigureOut">
+            <a:fld id="{C575075B-2A51-8543-9F57-FA2BF41A79EE}" type="datetime1">
               <a:rPr lang="it-IT" smtClean="0"/>
-              <a:t>14/05/19</a:t>
+              <a:t>15/05/19</a:t>
             </a:fld>
             <a:endParaRPr lang="it-IT"/>
           </a:p>
@@ -408,9 +781,9 @@
           <a:bodyPr/>
           <a:lstStyle/>
           <a:p>
-            <a:fld id="{C2430E77-6B1C-0540-83ED-E7236D778B0E}" type="datetimeFigureOut">
+            <a:fld id="{E8A0E634-A8C0-3A4E-97C6-79B07753868F}" type="datetime1">
               <a:rPr lang="it-IT" smtClean="0"/>
-              <a:t>14/05/19</a:t>
+              <a:t>15/05/19</a:t>
             </a:fld>
             <a:endParaRPr lang="it-IT"/>
           </a:p>
@@ -588,9 +961,9 @@
           <a:bodyPr/>
           <a:lstStyle/>
           <a:p>
-            <a:fld id="{C2430E77-6B1C-0540-83ED-E7236D778B0E}" type="datetimeFigureOut">
+            <a:fld id="{811A3FB6-9F11-604F-B0C3-A15A61E7B6F3}" type="datetime1">
               <a:rPr lang="it-IT" smtClean="0"/>
-              <a:t>14/05/19</a:t>
+              <a:t>15/05/19</a:t>
             </a:fld>
             <a:endParaRPr lang="it-IT"/>
           </a:p>
@@ -758,9 +1131,9 @@
           <a:bodyPr/>
           <a:lstStyle/>
           <a:p>
-            <a:fld id="{C2430E77-6B1C-0540-83ED-E7236D778B0E}" type="datetimeFigureOut">
+            <a:fld id="{6238D56E-A294-9C44-851E-0E0E9E952954}" type="datetime1">
               <a:rPr lang="it-IT" smtClean="0"/>
-              <a:t>14/05/19</a:t>
+              <a:t>15/05/19</a:t>
             </a:fld>
             <a:endParaRPr lang="it-IT"/>
           </a:p>
@@ -1002,9 +1375,9 @@
           <a:bodyPr/>
           <a:lstStyle/>
           <a:p>
-            <a:fld id="{C2430E77-6B1C-0540-83ED-E7236D778B0E}" type="datetimeFigureOut">
+            <a:fld id="{126B2E83-8DFC-F042-B41F-A348667E321E}" type="datetime1">
               <a:rPr lang="it-IT" smtClean="0"/>
-              <a:t>14/05/19</a:t>
+              <a:t>15/05/19</a:t>
             </a:fld>
             <a:endParaRPr lang="it-IT"/>
           </a:p>
@@ -1234,9 +1607,9 @@
           <a:bodyPr/>
           <a:lstStyle/>
           <a:p>
-            <a:fld id="{C2430E77-6B1C-0540-83ED-E7236D778B0E}" type="datetimeFigureOut">
+            <a:fld id="{1608AD82-6B35-AA42-B8FB-AF8E712A6A4F}" type="datetime1">
               <a:rPr lang="it-IT" smtClean="0"/>
-              <a:t>14/05/19</a:t>
+              <a:t>15/05/19</a:t>
             </a:fld>
             <a:endParaRPr lang="it-IT"/>
           </a:p>
@@ -1601,9 +1974,9 @@
           <a:bodyPr/>
           <a:lstStyle/>
           <a:p>
-            <a:fld id="{C2430E77-6B1C-0540-83ED-E7236D778B0E}" type="datetimeFigureOut">
+            <a:fld id="{FF97DA20-417A-1B44-8B45-D8E86BCA91AD}" type="datetime1">
               <a:rPr lang="it-IT" smtClean="0"/>
-              <a:t>14/05/19</a:t>
+              <a:t>15/05/19</a:t>
             </a:fld>
             <a:endParaRPr lang="it-IT"/>
           </a:p>
@@ -1719,9 +2092,9 @@
           <a:bodyPr/>
           <a:lstStyle/>
           <a:p>
-            <a:fld id="{C2430E77-6B1C-0540-83ED-E7236D778B0E}" type="datetimeFigureOut">
+            <a:fld id="{94FD93A2-7946-764D-83E9-B819694CC680}" type="datetime1">
               <a:rPr lang="it-IT" smtClean="0"/>
-              <a:t>14/05/19</a:t>
+              <a:t>15/05/19</a:t>
             </a:fld>
             <a:endParaRPr lang="it-IT"/>
           </a:p>
@@ -1814,9 +2187,9 @@
           <a:bodyPr/>
           <a:lstStyle/>
           <a:p>
-            <a:fld id="{C2430E77-6B1C-0540-83ED-E7236D778B0E}" type="datetimeFigureOut">
+            <a:fld id="{36D7DAB0-24F9-2A4E-A9B8-DF591F22490E}" type="datetime1">
               <a:rPr lang="it-IT" smtClean="0"/>
-              <a:t>14/05/19</a:t>
+              <a:t>15/05/19</a:t>
             </a:fld>
             <a:endParaRPr lang="it-IT"/>
           </a:p>
@@ -2091,9 +2464,9 @@
           <a:bodyPr/>
           <a:lstStyle/>
           <a:p>
-            <a:fld id="{C2430E77-6B1C-0540-83ED-E7236D778B0E}" type="datetimeFigureOut">
+            <a:fld id="{B4A51C5E-3FFF-9E46-A1F7-26D12C306935}" type="datetime1">
               <a:rPr lang="it-IT" smtClean="0"/>
-              <a:t>14/05/19</a:t>
+              <a:t>15/05/19</a:t>
             </a:fld>
             <a:endParaRPr lang="it-IT"/>
           </a:p>
@@ -2348,9 +2721,9 @@
           <a:bodyPr/>
           <a:lstStyle/>
           <a:p>
-            <a:fld id="{C2430E77-6B1C-0540-83ED-E7236D778B0E}" type="datetimeFigureOut">
+            <a:fld id="{DDC29506-2208-F640-8EFF-0175ADB97F0B}" type="datetime1">
               <a:rPr lang="it-IT" smtClean="0"/>
-              <a:t>14/05/19</a:t>
+              <a:t>15/05/19</a:t>
             </a:fld>
             <a:endParaRPr lang="it-IT"/>
           </a:p>
@@ -2561,9 +2934,9 @@
             </a:lvl1pPr>
           </a:lstStyle>
           <a:p>
-            <a:fld id="{C2430E77-6B1C-0540-83ED-E7236D778B0E}" type="datetimeFigureOut">
+            <a:fld id="{DEC899E1-E8EC-A449-8DBE-D007DB6E47F8}" type="datetime1">
               <a:rPr lang="it-IT" smtClean="0"/>
-              <a:t>14/05/19</a:t>
+              <a:t>15/05/19</a:t>
             </a:fld>
             <a:endParaRPr lang="it-IT"/>
           </a:p>
@@ -2668,6 +3041,7 @@
     <p:sldLayoutId id="2147483670" r:id="rId10"/>
     <p:sldLayoutId id="2147483671" r:id="rId11"/>
   </p:sldLayoutIdLst>
+  <p:hf sldNum="0" hdr="0" ftr="0" dt="0"/>
   <p:txStyles>
     <p:titleStyle>
       <a:lvl1pPr algn="l" defTabSz="914400" rtl="0" eaLnBrk="1" latinLnBrk="0" hangingPunct="1">
@@ -3576,7 +3950,2432 @@
 </p:sld>
 </file>
 
-<file path=ppt/slides/slide2.xml><?xml version="1.0" encoding="utf-8"?>
+<file path=ppt/slides/slide10.xml><?xml version="1.0" encoding="utf-8"?>
+<p:sld xmlns:a="http://schemas.openxmlformats.org/drawingml/2006/main" xmlns:r="http://schemas.openxmlformats.org/officeDocument/2006/relationships" xmlns:p="http://schemas.openxmlformats.org/presentationml/2006/main">
+  <p:cSld>
+    <p:spTree>
+      <p:nvGrpSpPr>
+        <p:cNvPr id="1" name=""/>
+        <p:cNvGrpSpPr/>
+        <p:nvPr/>
+      </p:nvGrpSpPr>
+      <p:grpSpPr>
+        <a:xfrm>
+          <a:off x="0" y="0"/>
+          <a:ext cx="0" cy="0"/>
+          <a:chOff x="0" y="0"/>
+          <a:chExt cx="0" cy="0"/>
+        </a:xfrm>
+      </p:grpSpPr>
+      <p:sp>
+        <p:nvSpPr>
+          <p:cNvPr id="2" name="Titolo 1">
+            <a:extLst>
+              <a:ext uri="{FF2B5EF4-FFF2-40B4-BE49-F238E27FC236}">
+                <a16:creationId xmlns:a16="http://schemas.microsoft.com/office/drawing/2014/main" id="{503931D8-D0CD-F34D-A8E4-4DBAF1645F4F}"/>
+              </a:ext>
+            </a:extLst>
+          </p:cNvPr>
+          <p:cNvSpPr>
+            <a:spLocks noGrp="1"/>
+          </p:cNvSpPr>
+          <p:nvPr>
+            <p:ph type="title"/>
+          </p:nvPr>
+        </p:nvSpPr>
+        <p:spPr/>
+        <p:style>
+          <a:lnRef idx="2">
+            <a:schemeClr val="accent2">
+              <a:shade val="50000"/>
+            </a:schemeClr>
+          </a:lnRef>
+          <a:fillRef idx="1">
+            <a:schemeClr val="accent2"/>
+          </a:fillRef>
+          <a:effectRef idx="0">
+            <a:schemeClr val="accent2"/>
+          </a:effectRef>
+          <a:fontRef idx="minor">
+            <a:schemeClr val="lt1"/>
+          </a:fontRef>
+        </p:style>
+        <p:txBody>
+          <a:bodyPr/>
+          <a:lstStyle/>
+          <a:p>
+            <a:r>
+              <a:rPr lang="it-IT" dirty="0"/>
+              <a:t>Indagine Contestuale - Risultati</a:t>
+            </a:r>
+          </a:p>
+        </p:txBody>
+      </p:sp>
+      <p:sp>
+        <p:nvSpPr>
+          <p:cNvPr id="6" name="Segnaposto contenuto 5">
+            <a:extLst>
+              <a:ext uri="{FF2B5EF4-FFF2-40B4-BE49-F238E27FC236}">
+                <a16:creationId xmlns:a16="http://schemas.microsoft.com/office/drawing/2014/main" id="{050B5B15-5721-8D42-B792-B940345657C9}"/>
+              </a:ext>
+            </a:extLst>
+          </p:cNvPr>
+          <p:cNvSpPr>
+            <a:spLocks noGrp="1"/>
+          </p:cNvSpPr>
+          <p:nvPr>
+            <p:ph idx="1"/>
+          </p:nvPr>
+        </p:nvSpPr>
+        <p:spPr/>
+        <p:txBody>
+          <a:bodyPr>
+            <a:normAutofit fontScale="92500"/>
+          </a:bodyPr>
+          <a:lstStyle/>
+          <a:p>
+            <a:pPr marL="0" indent="0">
+              <a:buNone/>
+            </a:pPr>
+            <a:r>
+              <a:rPr lang="it-IT" dirty="0"/>
+              <a:t>Dalle interviste è risultato che:</a:t>
+            </a:r>
+          </a:p>
+          <a:p>
+            <a:pPr lvl="0"/>
+            <a:r>
+              <a:rPr lang="it-IT" dirty="0"/>
+              <a:t>la tecnologia potrebbe giocare un ruolo rilevante per l’assegnazione di un alloggio</a:t>
+            </a:r>
+          </a:p>
+          <a:p>
+            <a:pPr lvl="0"/>
+            <a:r>
+              <a:rPr lang="it-IT" dirty="0"/>
+              <a:t>si preferisce alloggiare in un immobile non troppo distante da quello precedente</a:t>
+            </a:r>
+          </a:p>
+          <a:p>
+            <a:pPr lvl="0"/>
+            <a:r>
+              <a:rPr lang="it-IT" dirty="0"/>
+              <a:t>mettere i propri immobili a disposizione potrebbe aiutare sensibilmente le persone nella fase di gestione delle emergenze, e renderebbe addirittura plausibile saltare la fase di smistamento in tendopoli</a:t>
+            </a:r>
+          </a:p>
+          <a:p>
+            <a:pPr lvl="0"/>
+            <a:r>
+              <a:rPr lang="it-IT" dirty="0"/>
+              <a:t>l’iter burocratico deve essere ridotto al minimo</a:t>
+            </a:r>
+          </a:p>
+          <a:p>
+            <a:pPr marL="0" indent="0">
+              <a:buNone/>
+            </a:pPr>
+            <a:endParaRPr lang="it-IT" dirty="0"/>
+          </a:p>
+        </p:txBody>
+      </p:sp>
+    </p:spTree>
+    <p:extLst>
+      <p:ext uri="{BB962C8B-B14F-4D97-AF65-F5344CB8AC3E}">
+        <p14:creationId xmlns:p14="http://schemas.microsoft.com/office/powerpoint/2010/main" val="2566250097"/>
+      </p:ext>
+    </p:extLst>
+  </p:cSld>
+  <p:clrMapOvr>
+    <a:masterClrMapping/>
+  </p:clrMapOvr>
+</p:sld>
+</file>
+
+<file path=ppt/slides/slide11.xml><?xml version="1.0" encoding="utf-8"?>
+<p:sld xmlns:a="http://schemas.openxmlformats.org/drawingml/2006/main" xmlns:r="http://schemas.openxmlformats.org/officeDocument/2006/relationships" xmlns:p="http://schemas.openxmlformats.org/presentationml/2006/main">
+  <p:cSld>
+    <p:spTree>
+      <p:nvGrpSpPr>
+        <p:cNvPr id="1" name=""/>
+        <p:cNvGrpSpPr/>
+        <p:nvPr/>
+      </p:nvGrpSpPr>
+      <p:grpSpPr>
+        <a:xfrm>
+          <a:off x="0" y="0"/>
+          <a:ext cx="0" cy="0"/>
+          <a:chOff x="0" y="0"/>
+          <a:chExt cx="0" cy="0"/>
+        </a:xfrm>
+      </p:grpSpPr>
+      <p:sp>
+        <p:nvSpPr>
+          <p:cNvPr id="2" name="Titolo 1">
+            <a:extLst>
+              <a:ext uri="{FF2B5EF4-FFF2-40B4-BE49-F238E27FC236}">
+                <a16:creationId xmlns:a16="http://schemas.microsoft.com/office/drawing/2014/main" id="{503931D8-D0CD-F34D-A8E4-4DBAF1645F4F}"/>
+              </a:ext>
+            </a:extLst>
+          </p:cNvPr>
+          <p:cNvSpPr>
+            <a:spLocks noGrp="1"/>
+          </p:cNvSpPr>
+          <p:nvPr>
+            <p:ph type="title"/>
+          </p:nvPr>
+        </p:nvSpPr>
+        <p:spPr/>
+        <p:style>
+          <a:lnRef idx="2">
+            <a:schemeClr val="accent2">
+              <a:shade val="50000"/>
+            </a:schemeClr>
+          </a:lnRef>
+          <a:fillRef idx="1">
+            <a:schemeClr val="accent2"/>
+          </a:fillRef>
+          <a:effectRef idx="0">
+            <a:schemeClr val="accent2"/>
+          </a:effectRef>
+          <a:fontRef idx="minor">
+            <a:schemeClr val="lt1"/>
+          </a:fontRef>
+        </p:style>
+        <p:txBody>
+          <a:bodyPr/>
+          <a:lstStyle/>
+          <a:p>
+            <a:r>
+              <a:rPr lang="it-IT" dirty="0"/>
+              <a:t>Indagine Contestuale - Risultati</a:t>
+            </a:r>
+          </a:p>
+        </p:txBody>
+      </p:sp>
+      <p:sp>
+        <p:nvSpPr>
+          <p:cNvPr id="6" name="Segnaposto contenuto 5">
+            <a:extLst>
+              <a:ext uri="{FF2B5EF4-FFF2-40B4-BE49-F238E27FC236}">
+                <a16:creationId xmlns:a16="http://schemas.microsoft.com/office/drawing/2014/main" id="{050B5B15-5721-8D42-B792-B940345657C9}"/>
+              </a:ext>
+            </a:extLst>
+          </p:cNvPr>
+          <p:cNvSpPr>
+            <a:spLocks noGrp="1"/>
+          </p:cNvSpPr>
+          <p:nvPr>
+            <p:ph idx="1"/>
+          </p:nvPr>
+        </p:nvSpPr>
+        <p:spPr>
+          <a:xfrm>
+            <a:off x="628650" y="1825625"/>
+            <a:ext cx="7886700" cy="4530726"/>
+          </a:xfrm>
+        </p:spPr>
+        <p:txBody>
+          <a:bodyPr>
+            <a:normAutofit fontScale="55000" lnSpcReduction="20000"/>
+          </a:bodyPr>
+          <a:lstStyle/>
+          <a:p>
+            <a:pPr marL="0" indent="0">
+              <a:buNone/>
+            </a:pPr>
+            <a:r>
+              <a:rPr lang="it-IT" sz="4400" dirty="0"/>
+              <a:t>Dal sondaggio online è risultato che:</a:t>
+            </a:r>
+          </a:p>
+          <a:p>
+            <a:pPr lvl="0"/>
+            <a:r>
+              <a:rPr lang="it-IT" dirty="0"/>
+              <a:t>la maggioranza degli intervistati ha un ottimo rapporto con la tecnologia</a:t>
+            </a:r>
+          </a:p>
+          <a:p>
+            <a:pPr lvl="0"/>
+            <a:r>
+              <a:rPr lang="it-IT" dirty="0"/>
+              <a:t>spesso si possiede un altro immobile oltre a quello in cui si vive</a:t>
+            </a:r>
+          </a:p>
+          <a:p>
+            <a:pPr lvl="0"/>
+            <a:r>
+              <a:rPr lang="it-IT" dirty="0"/>
+              <a:t>si possiede in media un solo altro immobile oltre a quello in cui si vive</a:t>
+            </a:r>
+          </a:p>
+          <a:p>
+            <a:pPr lvl="0"/>
+            <a:r>
+              <a:rPr lang="it-IT" dirty="0"/>
+              <a:t>si è propensi a mettere a disposizione l’immobile in caso di emergenza</a:t>
+            </a:r>
+          </a:p>
+          <a:p>
+            <a:pPr lvl="0"/>
+            <a:r>
+              <a:rPr lang="it-IT" dirty="0"/>
+              <a:t>operazioni burocratiche con tempi lunghi farebbero desistere la maggior parte degli intervistati dal mettere a disposizione un proprio immobile</a:t>
+            </a:r>
+          </a:p>
+          <a:p>
+            <a:pPr lvl="0"/>
+            <a:r>
+              <a:rPr lang="it-IT" dirty="0"/>
+              <a:t>la maggioranza degli intervistati non ha dovuto trovare un altro alloggio per cause di forse maggiori</a:t>
+            </a:r>
+          </a:p>
+          <a:p>
+            <a:pPr lvl="0"/>
+            <a:r>
+              <a:rPr lang="it-IT" dirty="0"/>
+              <a:t>chi si è trovato in situazione di emergenza si è mosso autonomamente nel trovare una nuova sistemazione</a:t>
+            </a:r>
+          </a:p>
+          <a:p>
+            <a:pPr lvl="0"/>
+            <a:r>
+              <a:rPr lang="it-IT" dirty="0"/>
+              <a:t>le persone mediamente vogliono restare nella stessa area di quella dell’abitazione lasciata</a:t>
+            </a:r>
+          </a:p>
+          <a:p>
+            <a:pPr lvl="0"/>
+            <a:r>
+              <a:rPr lang="it-IT" dirty="0"/>
+              <a:t>i nuclei familiari sono composti per lo più da 4 persone e sono prevalentemente assenti persone portatrici di handicap</a:t>
+            </a:r>
+          </a:p>
+          <a:p>
+            <a:pPr lvl="0"/>
+            <a:r>
+              <a:rPr lang="it-IT" dirty="0"/>
+              <a:t>è risultato molto importante dare la possibilità di mettere a disposizione e assegnare un immobile online.</a:t>
+            </a:r>
+          </a:p>
+          <a:p>
+            <a:pPr marL="0" indent="0">
+              <a:buNone/>
+            </a:pPr>
+            <a:endParaRPr lang="it-IT" dirty="0"/>
+          </a:p>
+        </p:txBody>
+      </p:sp>
+    </p:spTree>
+    <p:extLst>
+      <p:ext uri="{BB962C8B-B14F-4D97-AF65-F5344CB8AC3E}">
+        <p14:creationId xmlns:p14="http://schemas.microsoft.com/office/powerpoint/2010/main" val="491695389"/>
+      </p:ext>
+    </p:extLst>
+  </p:cSld>
+  <p:clrMapOvr>
+    <a:masterClrMapping/>
+  </p:clrMapOvr>
+</p:sld>
+</file>
+
+<file path=ppt/slides/slide12.xml><?xml version="1.0" encoding="utf-8"?>
+<p:sld xmlns:a="http://schemas.openxmlformats.org/drawingml/2006/main" xmlns:r="http://schemas.openxmlformats.org/officeDocument/2006/relationships" xmlns:p="http://schemas.openxmlformats.org/presentationml/2006/main">
+  <p:cSld>
+    <p:spTree>
+      <p:nvGrpSpPr>
+        <p:cNvPr id="1" name=""/>
+        <p:cNvGrpSpPr/>
+        <p:nvPr/>
+      </p:nvGrpSpPr>
+      <p:grpSpPr>
+        <a:xfrm>
+          <a:off x="0" y="0"/>
+          <a:ext cx="0" cy="0"/>
+          <a:chOff x="0" y="0"/>
+          <a:chExt cx="0" cy="0"/>
+        </a:xfrm>
+      </p:grpSpPr>
+      <p:sp>
+        <p:nvSpPr>
+          <p:cNvPr id="2" name="Titolo 1">
+            <a:extLst>
+              <a:ext uri="{FF2B5EF4-FFF2-40B4-BE49-F238E27FC236}">
+                <a16:creationId xmlns:a16="http://schemas.microsoft.com/office/drawing/2014/main" id="{503931D8-D0CD-F34D-A8E4-4DBAF1645F4F}"/>
+              </a:ext>
+            </a:extLst>
+          </p:cNvPr>
+          <p:cNvSpPr>
+            <a:spLocks noGrp="1"/>
+          </p:cNvSpPr>
+          <p:nvPr>
+            <p:ph type="title"/>
+          </p:nvPr>
+        </p:nvSpPr>
+        <p:spPr/>
+        <p:style>
+          <a:lnRef idx="2">
+            <a:schemeClr val="accent2">
+              <a:shade val="50000"/>
+            </a:schemeClr>
+          </a:lnRef>
+          <a:fillRef idx="1">
+            <a:schemeClr val="accent2"/>
+          </a:fillRef>
+          <a:effectRef idx="0">
+            <a:schemeClr val="accent2"/>
+          </a:effectRef>
+          <a:fontRef idx="minor">
+            <a:schemeClr val="lt1"/>
+          </a:fontRef>
+        </p:style>
+        <p:txBody>
+          <a:bodyPr/>
+          <a:lstStyle/>
+          <a:p>
+            <a:r>
+              <a:rPr lang="it-IT" dirty="0"/>
+              <a:t>Profili Utente</a:t>
+            </a:r>
+          </a:p>
+        </p:txBody>
+      </p:sp>
+      <p:sp>
+        <p:nvSpPr>
+          <p:cNvPr id="6" name="Segnaposto contenuto 5">
+            <a:extLst>
+              <a:ext uri="{FF2B5EF4-FFF2-40B4-BE49-F238E27FC236}">
+                <a16:creationId xmlns:a16="http://schemas.microsoft.com/office/drawing/2014/main" id="{050B5B15-5721-8D42-B792-B940345657C9}"/>
+              </a:ext>
+            </a:extLst>
+          </p:cNvPr>
+          <p:cNvSpPr>
+            <a:spLocks noGrp="1"/>
+          </p:cNvSpPr>
+          <p:nvPr>
+            <p:ph idx="1"/>
+          </p:nvPr>
+        </p:nvSpPr>
+        <p:spPr>
+          <a:xfrm>
+            <a:off x="628650" y="1825625"/>
+            <a:ext cx="7886700" cy="4530726"/>
+          </a:xfrm>
+        </p:spPr>
+        <p:txBody>
+          <a:bodyPr>
+            <a:normAutofit/>
+          </a:bodyPr>
+          <a:lstStyle/>
+          <a:p>
+            <a:pPr marL="0" indent="0">
+              <a:buNone/>
+            </a:pPr>
+            <a:r>
+              <a:rPr lang="it-IT" sz="2400" dirty="0"/>
+              <a:t>A seguito delle interviste condotte con potenziali utenti ed esperti del settore e del sondaggio online, si è proceduto con la creazione di ‘</a:t>
+            </a:r>
+            <a:r>
+              <a:rPr lang="it-IT" sz="2400" dirty="0" err="1"/>
+              <a:t>Personas</a:t>
+            </a:r>
+            <a:r>
+              <a:rPr lang="it-IT" sz="2400" dirty="0"/>
+              <a:t>’ che abbiano una sintesi delle caratteristiche dei potenziali utenti del sistema. </a:t>
+            </a:r>
+            <a:br>
+              <a:rPr lang="it-IT" sz="2400" dirty="0"/>
+            </a:br>
+            <a:r>
+              <a:rPr lang="it-IT" sz="2400" dirty="0"/>
+              <a:t>Ogni Persona rappresenta un particolare gruppo di utenti. Avremo quindi</a:t>
+            </a:r>
+          </a:p>
+          <a:p>
+            <a:r>
+              <a:rPr lang="it-IT" sz="1800" dirty="0"/>
+              <a:t>Davide, utente che desidera mettere a disposizione un proprio immobile e successivamente gestirne la disponibilità o visualizzarne lo stato, ma non ha molto tempo libero</a:t>
+            </a:r>
+          </a:p>
+          <a:p>
+            <a:r>
+              <a:rPr lang="it-IT" sz="1800" dirty="0"/>
+              <a:t>Luca, volontario della Protezione Civile, desideroso di svolgere al meglio i suoi compiti e di individuare sempre nel modo più rapido ed efficace possibile le migliori sistemazioni per i cittadini che hanno perso la casa in seguito ad una catastrofe</a:t>
+            </a:r>
+          </a:p>
+          <a:p>
+            <a:endParaRPr lang="it-IT" dirty="0"/>
+          </a:p>
+          <a:p>
+            <a:endParaRPr lang="it-IT" dirty="0"/>
+          </a:p>
+          <a:p>
+            <a:endParaRPr lang="it-IT" dirty="0"/>
+          </a:p>
+          <a:p>
+            <a:endParaRPr lang="it-IT" dirty="0"/>
+          </a:p>
+        </p:txBody>
+      </p:sp>
+    </p:spTree>
+    <p:extLst>
+      <p:ext uri="{BB962C8B-B14F-4D97-AF65-F5344CB8AC3E}">
+        <p14:creationId xmlns:p14="http://schemas.microsoft.com/office/powerpoint/2010/main" val="2662132142"/>
+      </p:ext>
+    </p:extLst>
+  </p:cSld>
+  <p:clrMapOvr>
+    <a:masterClrMapping/>
+  </p:clrMapOvr>
+</p:sld>
+</file>
+
+<file path=ppt/slides/slide13.xml><?xml version="1.0" encoding="utf-8"?>
+<p:sld xmlns:a="http://schemas.openxmlformats.org/drawingml/2006/main" xmlns:r="http://schemas.openxmlformats.org/officeDocument/2006/relationships" xmlns:p="http://schemas.openxmlformats.org/presentationml/2006/main">
+  <p:cSld>
+    <p:bg>
+      <p:bgPr>
+        <a:solidFill>
+          <a:schemeClr val="bg1"/>
+        </a:solidFill>
+        <a:effectLst/>
+      </p:bgPr>
+    </p:bg>
+    <p:spTree>
+      <p:nvGrpSpPr>
+        <p:cNvPr id="1" name=""/>
+        <p:cNvGrpSpPr/>
+        <p:nvPr/>
+      </p:nvGrpSpPr>
+      <p:grpSpPr>
+        <a:xfrm>
+          <a:off x="0" y="0"/>
+          <a:ext cx="0" cy="0"/>
+          <a:chOff x="0" y="0"/>
+          <a:chExt cx="0" cy="0"/>
+        </a:xfrm>
+      </p:grpSpPr>
+      <p:sp>
+        <p:nvSpPr>
+          <p:cNvPr id="2" name="Titolo 1">
+            <a:extLst>
+              <a:ext uri="{FF2B5EF4-FFF2-40B4-BE49-F238E27FC236}">
+                <a16:creationId xmlns:a16="http://schemas.microsoft.com/office/drawing/2014/main" id="{503931D8-D0CD-F34D-A8E4-4DBAF1645F4F}"/>
+              </a:ext>
+            </a:extLst>
+          </p:cNvPr>
+          <p:cNvSpPr>
+            <a:spLocks noGrp="1"/>
+          </p:cNvSpPr>
+          <p:nvPr>
+            <p:ph type="title"/>
+          </p:nvPr>
+        </p:nvSpPr>
+        <p:spPr>
+          <a:xfrm>
+            <a:off x="3724072" y="629268"/>
+            <a:ext cx="4939868" cy="1286160"/>
+          </a:xfrm>
+        </p:spPr>
+        <p:style>
+          <a:lnRef idx="2">
+            <a:schemeClr val="accent2">
+              <a:shade val="50000"/>
+            </a:schemeClr>
+          </a:lnRef>
+          <a:fillRef idx="1">
+            <a:schemeClr val="accent2"/>
+          </a:fillRef>
+          <a:effectRef idx="0">
+            <a:schemeClr val="accent2"/>
+          </a:effectRef>
+          <a:fontRef idx="minor">
+            <a:schemeClr val="lt1"/>
+          </a:fontRef>
+        </p:style>
+        <p:txBody>
+          <a:bodyPr anchor="b">
+            <a:normAutofit/>
+          </a:bodyPr>
+          <a:lstStyle/>
+          <a:p>
+            <a:r>
+              <a:rPr lang="it-IT" sz="4100"/>
+              <a:t>Profili Utente - Davide</a:t>
+            </a:r>
+          </a:p>
+        </p:txBody>
+      </p:sp>
+      <p:pic>
+        <p:nvPicPr>
+          <p:cNvPr id="3" name="Immagine 2">
+            <a:extLst>
+              <a:ext uri="{FF2B5EF4-FFF2-40B4-BE49-F238E27FC236}">
+                <a16:creationId xmlns:a16="http://schemas.microsoft.com/office/drawing/2014/main" id="{0CFB2ADA-FB65-0E45-8DF9-407FA37F4FDE}"/>
+              </a:ext>
+            </a:extLst>
+          </p:cNvPr>
+          <p:cNvPicPr>
+            <a:picLocks noChangeAspect="1"/>
+          </p:cNvPicPr>
+          <p:nvPr/>
+        </p:nvPicPr>
+        <p:blipFill rotWithShape="1">
+          <a:blip r:embed="rId2"/>
+          <a:srcRect l="22912" r="19805"/>
+          <a:stretch/>
+        </p:blipFill>
+        <p:spPr>
+          <a:xfrm>
+            <a:off x="20" y="10"/>
+            <a:ext cx="3476673" cy="6857990"/>
+          </a:xfrm>
+          <a:prstGeom prst="rect">
+            <a:avLst/>
+          </a:prstGeom>
+          <a:effectLst/>
+        </p:spPr>
+      </p:pic>
+      <p:cxnSp>
+        <p:nvCxnSpPr>
+          <p:cNvPr id="30" name="Straight Connector 29">
+            <a:extLst>
+              <a:ext uri="{FF2B5EF4-FFF2-40B4-BE49-F238E27FC236}">
+                <a16:creationId xmlns:a16="http://schemas.microsoft.com/office/drawing/2014/main" id="{A7F400EE-A8A5-48AF-B4D6-291B52C6F0B0}"/>
+              </a:ext>
+              <a:ext uri="{C183D7F6-B498-43B3-948B-1728B52AA6E4}">
+                <adec:decorative xmlns:adec="http://schemas.microsoft.com/office/drawing/2017/decorative" val="1"/>
+              </a:ext>
+            </a:extLst>
+          </p:cNvPr>
+          <p:cNvCxnSpPr>
+            <a:cxnSpLocks noGrp="1" noRot="1" noChangeAspect="1" noMove="1" noResize="1" noEditPoints="1" noAdjustHandles="1" noChangeArrowheads="1" noChangeShapeType="1"/>
+          </p:cNvCxnSpPr>
+          <p:nvPr>
+            <p:extLst>
+              <p:ext uri="{386F3935-93C4-4BCD-93E2-E3B085C9AB24}">
+                <p16:designElem xmlns:p16="http://schemas.microsoft.com/office/powerpoint/2015/main" val="1"/>
+              </p:ext>
+            </p:extLst>
+          </p:nvPr>
+        </p:nvCxnSpPr>
+        <p:spPr>
+          <a:xfrm>
+            <a:off x="3810700" y="2115117"/>
+            <a:ext cx="4732020" cy="0"/>
+          </a:xfrm>
+          <a:prstGeom prst="line">
+            <a:avLst/>
+          </a:prstGeom>
+          <a:ln w="19050">
+            <a:solidFill>
+              <a:srgbClr val="DB8973"/>
+            </a:solidFill>
+          </a:ln>
+        </p:spPr>
+        <p:style>
+          <a:lnRef idx="1">
+            <a:schemeClr val="accent1"/>
+          </a:lnRef>
+          <a:fillRef idx="0">
+            <a:schemeClr val="accent1"/>
+          </a:fillRef>
+          <a:effectRef idx="0">
+            <a:schemeClr val="accent1"/>
+          </a:effectRef>
+          <a:fontRef idx="minor">
+            <a:schemeClr val="tx1"/>
+          </a:fontRef>
+        </p:style>
+      </p:cxnSp>
+      <p:sp>
+        <p:nvSpPr>
+          <p:cNvPr id="6" name="Segnaposto contenuto 5">
+            <a:extLst>
+              <a:ext uri="{FF2B5EF4-FFF2-40B4-BE49-F238E27FC236}">
+                <a16:creationId xmlns:a16="http://schemas.microsoft.com/office/drawing/2014/main" id="{050B5B15-5721-8D42-B792-B940345657C9}"/>
+              </a:ext>
+            </a:extLst>
+          </p:cNvPr>
+          <p:cNvSpPr>
+            <a:spLocks noGrp="1"/>
+          </p:cNvSpPr>
+          <p:nvPr>
+            <p:ph idx="1"/>
+          </p:nvPr>
+        </p:nvSpPr>
+        <p:spPr>
+          <a:xfrm>
+            <a:off x="3724073" y="2438400"/>
+            <a:ext cx="4939867" cy="3785419"/>
+          </a:xfrm>
+        </p:spPr>
+        <p:txBody>
+          <a:bodyPr>
+            <a:normAutofit lnSpcReduction="10000"/>
+          </a:bodyPr>
+          <a:lstStyle/>
+          <a:p>
+            <a:pPr marL="0" indent="0">
+              <a:buNone/>
+            </a:pPr>
+            <a:r>
+              <a:rPr lang="it-IT" sz="1600" dirty="0"/>
+              <a:t>Davide è un uomo di 29 anni e lavora come avvocato in uno studio legale a tempo pieno. Le sue giornate sono pienamente occupate dal lavoro e molto spesso è costretto a spostarsi per incontrare nuovi clienti. Con l’avanzare della sua carriera, Davide ha notato che ha sempre meno tempo per sé e che quindi il suo tempo libero è prezioso.</a:t>
+            </a:r>
+            <a:br>
+              <a:rPr lang="it-IT" sz="1600" dirty="0"/>
+            </a:br>
+            <a:r>
+              <a:rPr lang="it-IT" sz="1600" dirty="0"/>
+              <a:t>Essendo proprietario di 2 immobili che non usa (uno in Calabria e uno in Molise) oltre a quello in cui vive, pensa che sarebbe una buona idea quella di metterli a disposizione di chi ha perso la propria abitazione a causa di un’emergenza di qualche tipo, ottenendo magari delle agevolazioni fiscali da parte del comune.</a:t>
+            </a:r>
+            <a:br>
+              <a:rPr lang="it-IT" sz="1600" dirty="0"/>
+            </a:br>
+            <a:r>
+              <a:rPr lang="it-IT" sz="1600" dirty="0"/>
+              <a:t>L’ideale per Davide sarebbe però un prodotto software che permetta di svolgere questa operazione comodamente da casa, senza imbattersi in lunghe pratiche da compilare che occuperebbero molto del suo già scarso tempo libero.</a:t>
+            </a:r>
+          </a:p>
+          <a:p>
+            <a:endParaRPr lang="it-IT" sz="1400" dirty="0"/>
+          </a:p>
+          <a:p>
+            <a:endParaRPr lang="it-IT" sz="1400" dirty="0"/>
+          </a:p>
+        </p:txBody>
+      </p:sp>
+    </p:spTree>
+    <p:extLst>
+      <p:ext uri="{BB962C8B-B14F-4D97-AF65-F5344CB8AC3E}">
+        <p14:creationId xmlns:p14="http://schemas.microsoft.com/office/powerpoint/2010/main" val="2644421986"/>
+      </p:ext>
+    </p:extLst>
+  </p:cSld>
+  <p:clrMapOvr>
+    <a:masterClrMapping/>
+  </p:clrMapOvr>
+</p:sld>
+</file>
+
+<file path=ppt/slides/slide14.xml><?xml version="1.0" encoding="utf-8"?>
+<p:sld xmlns:a="http://schemas.openxmlformats.org/drawingml/2006/main" xmlns:r="http://schemas.openxmlformats.org/officeDocument/2006/relationships" xmlns:p="http://schemas.openxmlformats.org/presentationml/2006/main">
+  <p:cSld>
+    <p:bg>
+      <p:bgPr>
+        <a:solidFill>
+          <a:schemeClr val="bg1"/>
+        </a:solidFill>
+        <a:effectLst/>
+      </p:bgPr>
+    </p:bg>
+    <p:spTree>
+      <p:nvGrpSpPr>
+        <p:cNvPr id="1" name=""/>
+        <p:cNvGrpSpPr/>
+        <p:nvPr/>
+      </p:nvGrpSpPr>
+      <p:grpSpPr>
+        <a:xfrm>
+          <a:off x="0" y="0"/>
+          <a:ext cx="0" cy="0"/>
+          <a:chOff x="0" y="0"/>
+          <a:chExt cx="0" cy="0"/>
+        </a:xfrm>
+      </p:grpSpPr>
+      <p:sp>
+        <p:nvSpPr>
+          <p:cNvPr id="2" name="Titolo 1">
+            <a:extLst>
+              <a:ext uri="{FF2B5EF4-FFF2-40B4-BE49-F238E27FC236}">
+                <a16:creationId xmlns:a16="http://schemas.microsoft.com/office/drawing/2014/main" id="{503931D8-D0CD-F34D-A8E4-4DBAF1645F4F}"/>
+              </a:ext>
+            </a:extLst>
+          </p:cNvPr>
+          <p:cNvSpPr>
+            <a:spLocks noGrp="1"/>
+          </p:cNvSpPr>
+          <p:nvPr>
+            <p:ph type="title"/>
+          </p:nvPr>
+        </p:nvSpPr>
+        <p:spPr>
+          <a:xfrm>
+            <a:off x="3724072" y="629268"/>
+            <a:ext cx="4939868" cy="1286160"/>
+          </a:xfrm>
+        </p:spPr>
+        <p:style>
+          <a:lnRef idx="2">
+            <a:schemeClr val="accent2">
+              <a:shade val="50000"/>
+            </a:schemeClr>
+          </a:lnRef>
+          <a:fillRef idx="1">
+            <a:schemeClr val="accent2"/>
+          </a:fillRef>
+          <a:effectRef idx="0">
+            <a:schemeClr val="accent2"/>
+          </a:effectRef>
+          <a:fontRef idx="minor">
+            <a:schemeClr val="lt1"/>
+          </a:fontRef>
+        </p:style>
+        <p:txBody>
+          <a:bodyPr anchor="b">
+            <a:normAutofit/>
+          </a:bodyPr>
+          <a:lstStyle/>
+          <a:p>
+            <a:r>
+              <a:rPr lang="it-IT"/>
+              <a:t>Profili Utente - Luca</a:t>
+            </a:r>
+          </a:p>
+        </p:txBody>
+      </p:sp>
+      <p:pic>
+        <p:nvPicPr>
+          <p:cNvPr id="5" name="Immagine 4">
+            <a:extLst>
+              <a:ext uri="{FF2B5EF4-FFF2-40B4-BE49-F238E27FC236}">
+                <a16:creationId xmlns:a16="http://schemas.microsoft.com/office/drawing/2014/main" id="{9A3FF335-FB2F-B34F-B1E2-95AFE52B0884}"/>
+              </a:ext>
+            </a:extLst>
+          </p:cNvPr>
+          <p:cNvPicPr>
+            <a:picLocks noChangeAspect="1"/>
+          </p:cNvPicPr>
+          <p:nvPr/>
+        </p:nvPicPr>
+        <p:blipFill rotWithShape="1">
+          <a:blip r:embed="rId2"/>
+          <a:srcRect l="1593" r="28723"/>
+          <a:stretch/>
+        </p:blipFill>
+        <p:spPr>
+          <a:xfrm>
+            <a:off x="20" y="10"/>
+            <a:ext cx="3476673" cy="6857990"/>
+          </a:xfrm>
+          <a:prstGeom prst="rect">
+            <a:avLst/>
+          </a:prstGeom>
+          <a:effectLst/>
+        </p:spPr>
+      </p:pic>
+      <p:cxnSp>
+        <p:nvCxnSpPr>
+          <p:cNvPr id="30" name="Straight Connector 29">
+            <a:extLst>
+              <a:ext uri="{FF2B5EF4-FFF2-40B4-BE49-F238E27FC236}">
+                <a16:creationId xmlns:a16="http://schemas.microsoft.com/office/drawing/2014/main" id="{A7F400EE-A8A5-48AF-B4D6-291B52C6F0B0}"/>
+              </a:ext>
+              <a:ext uri="{C183D7F6-B498-43B3-948B-1728B52AA6E4}">
+                <adec:decorative xmlns:adec="http://schemas.microsoft.com/office/drawing/2017/decorative" val="1"/>
+              </a:ext>
+            </a:extLst>
+          </p:cNvPr>
+          <p:cNvCxnSpPr>
+            <a:cxnSpLocks noGrp="1" noRot="1" noChangeAspect="1" noMove="1" noResize="1" noEditPoints="1" noAdjustHandles="1" noChangeArrowheads="1" noChangeShapeType="1"/>
+          </p:cNvCxnSpPr>
+          <p:nvPr>
+            <p:extLst>
+              <p:ext uri="{386F3935-93C4-4BCD-93E2-E3B085C9AB24}">
+                <p16:designElem xmlns:p16="http://schemas.microsoft.com/office/powerpoint/2015/main" val="1"/>
+              </p:ext>
+            </p:extLst>
+          </p:nvPr>
+        </p:nvCxnSpPr>
+        <p:spPr>
+          <a:xfrm>
+            <a:off x="3810700" y="2115117"/>
+            <a:ext cx="4732020" cy="0"/>
+          </a:xfrm>
+          <a:prstGeom prst="line">
+            <a:avLst/>
+          </a:prstGeom>
+          <a:ln w="19050">
+            <a:solidFill>
+              <a:srgbClr val="2B34DE"/>
+            </a:solidFill>
+          </a:ln>
+        </p:spPr>
+        <p:style>
+          <a:lnRef idx="1">
+            <a:schemeClr val="accent1"/>
+          </a:lnRef>
+          <a:fillRef idx="0">
+            <a:schemeClr val="accent1"/>
+          </a:fillRef>
+          <a:effectRef idx="0">
+            <a:schemeClr val="accent1"/>
+          </a:effectRef>
+          <a:fontRef idx="minor">
+            <a:schemeClr val="tx1"/>
+          </a:fontRef>
+        </p:style>
+      </p:cxnSp>
+      <p:sp>
+        <p:nvSpPr>
+          <p:cNvPr id="6" name="Segnaposto contenuto 5">
+            <a:extLst>
+              <a:ext uri="{FF2B5EF4-FFF2-40B4-BE49-F238E27FC236}">
+                <a16:creationId xmlns:a16="http://schemas.microsoft.com/office/drawing/2014/main" id="{050B5B15-5721-8D42-B792-B940345657C9}"/>
+              </a:ext>
+            </a:extLst>
+          </p:cNvPr>
+          <p:cNvSpPr>
+            <a:spLocks noGrp="1"/>
+          </p:cNvSpPr>
+          <p:nvPr>
+            <p:ph idx="1"/>
+          </p:nvPr>
+        </p:nvSpPr>
+        <p:spPr>
+          <a:xfrm>
+            <a:off x="3724073" y="2203940"/>
+            <a:ext cx="4939867" cy="4152410"/>
+          </a:xfrm>
+        </p:spPr>
+        <p:txBody>
+          <a:bodyPr>
+            <a:normAutofit fontScale="70000" lnSpcReduction="20000"/>
+          </a:bodyPr>
+          <a:lstStyle/>
+          <a:p>
+            <a:pPr marL="0" indent="0">
+              <a:buNone/>
+            </a:pPr>
+            <a:r>
+              <a:rPr lang="it-IT" sz="2200" dirty="0"/>
+              <a:t>Luca è un uomo di 32 anni, impiegato in un’azienda di Napoli in cui svolge il ruolo di programmatore. Nel suo tempo libero, egli fa volontariato nella protezione civile di Nola, paese in cui vive, da 10 anni. Nel 2009 si recò in Abruzzo, nella città di L’Aquila, a seguito del terremoto di magnitudo 5.9 della scala Richter che si verificò nel mese di aprile, per aiutare la protezione civile. </a:t>
+            </a:r>
+            <a:br>
+              <a:rPr lang="it-IT" sz="2200" dirty="0"/>
+            </a:br>
+            <a:r>
+              <a:rPr lang="it-IT" sz="2200" dirty="0"/>
+              <a:t>In quell’occasione Luca ha appurato che le tendopoli allestite per le persone non erano sufficienti e che per molto tempo le persone si sono ritrovate a vivere in alloggi ristretti e scomodi; da questa esperienza ha maturato l’idea che potrebbe essere utile mettere a disposizione una propria abitazione che non si usa o che si usa poco per le persone che vivono una situazione di emergenza. Per Luca, oltre alla parte di messa a disposizione di un’immobile, è chiara anche l’importanza di dare la possibilità alla protezione civile di accedere a questa lista di immobili e ai loro dettagli, per procedere con l’assegnazione alle famiglie, e ipotizza che ciò permetterebbe in molti casi di evitare interamente la fase della tendopoli.</a:t>
+            </a:r>
+            <a:br>
+              <a:rPr lang="it-IT" sz="2200" dirty="0"/>
+            </a:br>
+            <a:r>
+              <a:rPr lang="it-IT" sz="2200" dirty="0"/>
+              <a:t>Luca è quindi fiducioso che un sito web che gestisca questo tipo di problematica potrebbe aiutare sensibilmente chi si ritrova senza una casa per un’emergenza. </a:t>
+            </a:r>
+          </a:p>
+          <a:p>
+            <a:endParaRPr lang="it-IT" sz="1300" dirty="0"/>
+          </a:p>
+        </p:txBody>
+      </p:sp>
+    </p:spTree>
+    <p:extLst>
+      <p:ext uri="{BB962C8B-B14F-4D97-AF65-F5344CB8AC3E}">
+        <p14:creationId xmlns:p14="http://schemas.microsoft.com/office/powerpoint/2010/main" val="1894541184"/>
+      </p:ext>
+    </p:extLst>
+  </p:cSld>
+  <p:clrMapOvr>
+    <a:masterClrMapping/>
+  </p:clrMapOvr>
+</p:sld>
+</file>
+
+<file path=ppt/slides/slide15.xml><?xml version="1.0" encoding="utf-8"?>
+<p:sld xmlns:a="http://schemas.openxmlformats.org/drawingml/2006/main" xmlns:r="http://schemas.openxmlformats.org/officeDocument/2006/relationships" xmlns:p="http://schemas.openxmlformats.org/presentationml/2006/main">
+  <p:cSld>
+    <p:spTree>
+      <p:nvGrpSpPr>
+        <p:cNvPr id="1" name=""/>
+        <p:cNvGrpSpPr/>
+        <p:nvPr/>
+      </p:nvGrpSpPr>
+      <p:grpSpPr>
+        <a:xfrm>
+          <a:off x="0" y="0"/>
+          <a:ext cx="0" cy="0"/>
+          <a:chOff x="0" y="0"/>
+          <a:chExt cx="0" cy="0"/>
+        </a:xfrm>
+      </p:grpSpPr>
+      <p:sp>
+        <p:nvSpPr>
+          <p:cNvPr id="2" name="Titolo 1">
+            <a:extLst>
+              <a:ext uri="{FF2B5EF4-FFF2-40B4-BE49-F238E27FC236}">
+                <a16:creationId xmlns:a16="http://schemas.microsoft.com/office/drawing/2014/main" id="{503931D8-D0CD-F34D-A8E4-4DBAF1645F4F}"/>
+              </a:ext>
+            </a:extLst>
+          </p:cNvPr>
+          <p:cNvSpPr>
+            <a:spLocks noGrp="1"/>
+          </p:cNvSpPr>
+          <p:nvPr>
+            <p:ph type="title"/>
+          </p:nvPr>
+        </p:nvSpPr>
+        <p:spPr/>
+        <p:style>
+          <a:lnRef idx="2">
+            <a:schemeClr val="accent2">
+              <a:shade val="50000"/>
+            </a:schemeClr>
+          </a:lnRef>
+          <a:fillRef idx="1">
+            <a:schemeClr val="accent2"/>
+          </a:fillRef>
+          <a:effectRef idx="0">
+            <a:schemeClr val="accent2"/>
+          </a:effectRef>
+          <a:fontRef idx="minor">
+            <a:schemeClr val="lt1"/>
+          </a:fontRef>
+        </p:style>
+        <p:txBody>
+          <a:bodyPr/>
+          <a:lstStyle/>
+          <a:p>
+            <a:r>
+              <a:rPr lang="it-IT" dirty="0" err="1"/>
+              <a:t>Problem</a:t>
+            </a:r>
+            <a:r>
+              <a:rPr lang="it-IT" dirty="0"/>
+              <a:t> </a:t>
+            </a:r>
+            <a:r>
+              <a:rPr lang="it-IT" dirty="0" err="1"/>
+              <a:t>Scenarios</a:t>
+            </a:r>
+            <a:r>
+              <a:rPr lang="it-IT" dirty="0"/>
+              <a:t> e </a:t>
+            </a:r>
+            <a:r>
+              <a:rPr lang="it-IT" dirty="0" err="1"/>
+              <a:t>Claim</a:t>
+            </a:r>
+            <a:endParaRPr lang="it-IT" dirty="0"/>
+          </a:p>
+        </p:txBody>
+      </p:sp>
+      <p:sp>
+        <p:nvSpPr>
+          <p:cNvPr id="6" name="Segnaposto contenuto 5">
+            <a:extLst>
+              <a:ext uri="{FF2B5EF4-FFF2-40B4-BE49-F238E27FC236}">
+                <a16:creationId xmlns:a16="http://schemas.microsoft.com/office/drawing/2014/main" id="{050B5B15-5721-8D42-B792-B940345657C9}"/>
+              </a:ext>
+            </a:extLst>
+          </p:cNvPr>
+          <p:cNvSpPr>
+            <a:spLocks noGrp="1"/>
+          </p:cNvSpPr>
+          <p:nvPr>
+            <p:ph idx="1"/>
+          </p:nvPr>
+        </p:nvSpPr>
+        <p:spPr>
+          <a:xfrm>
+            <a:off x="628650" y="1825625"/>
+            <a:ext cx="7886700" cy="4530726"/>
+          </a:xfrm>
+        </p:spPr>
+        <p:txBody>
+          <a:bodyPr>
+            <a:normAutofit lnSpcReduction="10000"/>
+          </a:bodyPr>
+          <a:lstStyle/>
+          <a:p>
+            <a:pPr marL="0" indent="0">
+              <a:buNone/>
+            </a:pPr>
+            <a:r>
+              <a:rPr lang="en" dirty="0"/>
+              <a:t>Uno scenario </a:t>
+            </a:r>
+            <a:r>
+              <a:rPr lang="en" dirty="0" err="1"/>
+              <a:t>è</a:t>
+            </a:r>
+            <a:r>
+              <a:rPr lang="en" dirty="0"/>
+              <a:t> </a:t>
+            </a:r>
+            <a:r>
+              <a:rPr lang="en" dirty="0" err="1"/>
+              <a:t>una</a:t>
+            </a:r>
+            <a:r>
+              <a:rPr lang="en" dirty="0"/>
+              <a:t> </a:t>
+            </a:r>
+            <a:r>
+              <a:rPr lang="en" dirty="0" err="1"/>
+              <a:t>descrizione</a:t>
+            </a:r>
+            <a:r>
+              <a:rPr lang="en" dirty="0"/>
+              <a:t> </a:t>
+            </a:r>
+            <a:r>
+              <a:rPr lang="en" dirty="0" err="1"/>
+              <a:t>dell’interazione</a:t>
+            </a:r>
+            <a:r>
+              <a:rPr lang="en" dirty="0"/>
+              <a:t> di </a:t>
+            </a:r>
+            <a:r>
+              <a:rPr lang="en" dirty="0" err="1"/>
+              <a:t>uno</a:t>
+            </a:r>
+            <a:r>
+              <a:rPr lang="en" dirty="0"/>
+              <a:t> o </a:t>
+            </a:r>
+            <a:r>
+              <a:rPr lang="en" dirty="0" err="1"/>
+              <a:t>più</a:t>
+            </a:r>
+            <a:r>
+              <a:rPr lang="en" dirty="0"/>
+              <a:t> </a:t>
+            </a:r>
+            <a:r>
+              <a:rPr lang="en" dirty="0" err="1"/>
+              <a:t>utenti</a:t>
+            </a:r>
+            <a:r>
+              <a:rPr lang="en" dirty="0"/>
+              <a:t> con un </a:t>
+            </a:r>
+            <a:r>
+              <a:rPr lang="it-IT" dirty="0" err="1"/>
+              <a:t>S</a:t>
+            </a:r>
+            <a:r>
+              <a:rPr lang="en" dirty="0" err="1"/>
+              <a:t>istema</a:t>
+            </a:r>
+            <a:r>
+              <a:rPr lang="en" dirty="0"/>
+              <a:t>, </a:t>
+            </a:r>
+            <a:r>
+              <a:rPr lang="en" dirty="0" err="1"/>
+              <a:t>dispositivo</a:t>
+            </a:r>
+            <a:r>
+              <a:rPr lang="en" dirty="0"/>
+              <a:t> o </a:t>
+            </a:r>
+            <a:r>
+              <a:rPr lang="en" dirty="0" err="1"/>
+              <a:t>processo</a:t>
+            </a:r>
+            <a:r>
+              <a:rPr lang="en" dirty="0"/>
+              <a:t>, con lo </a:t>
+            </a:r>
+            <a:r>
+              <a:rPr lang="en" dirty="0" err="1"/>
+              <a:t>scopo</a:t>
+            </a:r>
+            <a:r>
+              <a:rPr lang="en" dirty="0"/>
+              <a:t> di </a:t>
+            </a:r>
+            <a:r>
+              <a:rPr lang="en" dirty="0" err="1"/>
+              <a:t>raggiungere</a:t>
+            </a:r>
+            <a:r>
+              <a:rPr lang="en" dirty="0"/>
+              <a:t> un </a:t>
+            </a:r>
+            <a:r>
+              <a:rPr lang="en" dirty="0" err="1"/>
+              <a:t>obbiettivo</a:t>
+            </a:r>
+            <a:r>
+              <a:rPr lang="en" dirty="0"/>
+              <a:t> sotto determinate </a:t>
+            </a:r>
+            <a:r>
+              <a:rPr lang="en" dirty="0" err="1"/>
+              <a:t>condizioni</a:t>
+            </a:r>
+            <a:r>
+              <a:rPr lang="en" dirty="0"/>
+              <a:t> e </a:t>
+            </a:r>
+            <a:r>
+              <a:rPr lang="en" dirty="0" err="1"/>
+              <a:t>vincoli</a:t>
+            </a:r>
+            <a:r>
+              <a:rPr lang="en" dirty="0"/>
+              <a:t>. </a:t>
+            </a:r>
+          </a:p>
+          <a:p>
+            <a:pPr marL="0" indent="0">
+              <a:buNone/>
+            </a:pPr>
+            <a:r>
+              <a:rPr lang="en" dirty="0" err="1"/>
+              <a:t>Gli</a:t>
+            </a:r>
+            <a:r>
+              <a:rPr lang="en" dirty="0"/>
+              <a:t> </a:t>
+            </a:r>
+            <a:r>
+              <a:rPr lang="en" dirty="0" err="1"/>
+              <a:t>scenari</a:t>
+            </a:r>
+            <a:r>
+              <a:rPr lang="en" dirty="0"/>
+              <a:t> </a:t>
+            </a:r>
+            <a:r>
+              <a:rPr lang="en" dirty="0" err="1"/>
+              <a:t>forniscono</a:t>
+            </a:r>
+            <a:r>
+              <a:rPr lang="en" dirty="0"/>
+              <a:t> </a:t>
+            </a:r>
+            <a:r>
+              <a:rPr lang="en" dirty="0" err="1"/>
+              <a:t>informazioni</a:t>
+            </a:r>
+            <a:r>
+              <a:rPr lang="en" dirty="0"/>
+              <a:t> </a:t>
+            </a:r>
+            <a:r>
+              <a:rPr lang="en" dirty="0" err="1"/>
+              <a:t>rispetto</a:t>
+            </a:r>
+            <a:r>
+              <a:rPr lang="en" dirty="0"/>
+              <a:t> al contest </a:t>
+            </a:r>
+            <a:r>
+              <a:rPr lang="en" dirty="0" err="1"/>
+              <a:t>nel</a:t>
+            </a:r>
+            <a:r>
+              <a:rPr lang="en" dirty="0"/>
+              <a:t> quale </a:t>
+            </a:r>
+            <a:r>
+              <a:rPr lang="en" dirty="0" err="1"/>
+              <a:t>il</a:t>
+            </a:r>
+            <a:r>
+              <a:rPr lang="en" dirty="0"/>
+              <a:t> </a:t>
+            </a:r>
+            <a:r>
+              <a:rPr lang="it-IT" dirty="0" err="1"/>
+              <a:t>S</a:t>
+            </a:r>
+            <a:r>
+              <a:rPr lang="en" dirty="0" err="1"/>
+              <a:t>istema</a:t>
+            </a:r>
+            <a:r>
+              <a:rPr lang="en" dirty="0"/>
+              <a:t> </a:t>
+            </a:r>
+            <a:r>
+              <a:rPr lang="en" dirty="0" err="1"/>
+              <a:t>deve</a:t>
+            </a:r>
+            <a:r>
+              <a:rPr lang="en" dirty="0"/>
+              <a:t> </a:t>
+            </a:r>
+            <a:r>
+              <a:rPr lang="en" dirty="0" err="1"/>
+              <a:t>operare</a:t>
+            </a:r>
+            <a:r>
+              <a:rPr lang="en" dirty="0"/>
+              <a:t>, in </a:t>
+            </a:r>
+            <a:r>
+              <a:rPr lang="en" dirty="0" err="1"/>
+              <a:t>una</a:t>
+            </a:r>
+            <a:r>
+              <a:rPr lang="en" dirty="0"/>
+              <a:t> vision </a:t>
+            </a:r>
+            <a:r>
+              <a:rPr lang="en" dirty="0" err="1"/>
+              <a:t>orientat</a:t>
+            </a:r>
+            <a:r>
+              <a:rPr lang="it-IT" dirty="0"/>
+              <a:t>e</a:t>
+            </a:r>
+            <a:r>
+              <a:rPr lang="en" dirty="0"/>
+              <a:t> al task e </a:t>
+            </a:r>
+            <a:r>
+              <a:rPr lang="en" dirty="0" err="1"/>
+              <a:t>all’utente</a:t>
+            </a:r>
+            <a:r>
+              <a:rPr lang="en" dirty="0"/>
+              <a:t> </a:t>
+            </a:r>
+            <a:r>
+              <a:rPr lang="en" dirty="0" err="1"/>
+              <a:t>stesso</a:t>
+            </a:r>
+            <a:r>
+              <a:rPr lang="en" dirty="0"/>
+              <a:t>.</a:t>
+            </a:r>
+          </a:p>
+          <a:p>
+            <a:pPr marL="0" indent="0">
+              <a:buNone/>
+            </a:pPr>
+            <a:r>
+              <a:rPr lang="en" dirty="0" err="1"/>
+              <a:t>Relativamente</a:t>
+            </a:r>
+            <a:r>
+              <a:rPr lang="en" dirty="0"/>
+              <a:t> ad </a:t>
+            </a:r>
+            <a:r>
+              <a:rPr lang="en" dirty="0" err="1"/>
+              <a:t>ogni</a:t>
+            </a:r>
+            <a:r>
+              <a:rPr lang="en" dirty="0"/>
+              <a:t> scenario, </a:t>
+            </a:r>
+            <a:r>
+              <a:rPr lang="en" dirty="0" err="1"/>
+              <a:t>vengono</a:t>
+            </a:r>
+            <a:r>
+              <a:rPr lang="en" dirty="0"/>
+              <a:t> poi </a:t>
+            </a:r>
+            <a:r>
+              <a:rPr lang="en" dirty="0" err="1"/>
+              <a:t>esaminati</a:t>
+            </a:r>
+            <a:r>
+              <a:rPr lang="en" dirty="0"/>
+              <a:t> </a:t>
+            </a:r>
+            <a:r>
+              <a:rPr lang="it-IT" dirty="0"/>
+              <a:t>i </a:t>
+            </a:r>
+            <a:r>
+              <a:rPr lang="it-IT" dirty="0" err="1"/>
+              <a:t>claim</a:t>
+            </a:r>
+            <a:r>
+              <a:rPr lang="it-IT" dirty="0"/>
+              <a:t>, ossia elementi della situazione in questione che si ritiene abbiano conseguenze importanti – negative o positive che siano – per gli attori dello scenario.</a:t>
+            </a:r>
+          </a:p>
+          <a:p>
+            <a:pPr marL="0" indent="0">
+              <a:buNone/>
+            </a:pPr>
+            <a:endParaRPr lang="it-IT" dirty="0"/>
+          </a:p>
+          <a:p>
+            <a:endParaRPr lang="it-IT" dirty="0"/>
+          </a:p>
+          <a:p>
+            <a:endParaRPr lang="it-IT" dirty="0"/>
+          </a:p>
+          <a:p>
+            <a:endParaRPr lang="it-IT" dirty="0"/>
+          </a:p>
+          <a:p>
+            <a:endParaRPr lang="it-IT" dirty="0"/>
+          </a:p>
+        </p:txBody>
+      </p:sp>
+    </p:spTree>
+    <p:extLst>
+      <p:ext uri="{BB962C8B-B14F-4D97-AF65-F5344CB8AC3E}">
+        <p14:creationId xmlns:p14="http://schemas.microsoft.com/office/powerpoint/2010/main" val="2207507129"/>
+      </p:ext>
+    </p:extLst>
+  </p:cSld>
+  <p:clrMapOvr>
+    <a:masterClrMapping/>
+  </p:clrMapOvr>
+</p:sld>
+</file>
+
+<file path=ppt/slides/slide16.xml><?xml version="1.0" encoding="utf-8"?>
+<p:sld xmlns:a="http://schemas.openxmlformats.org/drawingml/2006/main" xmlns:r="http://schemas.openxmlformats.org/officeDocument/2006/relationships" xmlns:p="http://schemas.openxmlformats.org/presentationml/2006/main">
+  <p:cSld>
+    <p:spTree>
+      <p:nvGrpSpPr>
+        <p:cNvPr id="1" name=""/>
+        <p:cNvGrpSpPr/>
+        <p:nvPr/>
+      </p:nvGrpSpPr>
+      <p:grpSpPr>
+        <a:xfrm>
+          <a:off x="0" y="0"/>
+          <a:ext cx="0" cy="0"/>
+          <a:chOff x="0" y="0"/>
+          <a:chExt cx="0" cy="0"/>
+        </a:xfrm>
+      </p:grpSpPr>
+      <p:sp>
+        <p:nvSpPr>
+          <p:cNvPr id="2" name="Titolo 1">
+            <a:extLst>
+              <a:ext uri="{FF2B5EF4-FFF2-40B4-BE49-F238E27FC236}">
+                <a16:creationId xmlns:a16="http://schemas.microsoft.com/office/drawing/2014/main" id="{503931D8-D0CD-F34D-A8E4-4DBAF1645F4F}"/>
+              </a:ext>
+            </a:extLst>
+          </p:cNvPr>
+          <p:cNvSpPr>
+            <a:spLocks noGrp="1"/>
+          </p:cNvSpPr>
+          <p:nvPr>
+            <p:ph type="title"/>
+          </p:nvPr>
+        </p:nvSpPr>
+        <p:spPr/>
+        <p:style>
+          <a:lnRef idx="2">
+            <a:schemeClr val="accent2">
+              <a:shade val="50000"/>
+            </a:schemeClr>
+          </a:lnRef>
+          <a:fillRef idx="1">
+            <a:schemeClr val="accent2"/>
+          </a:fillRef>
+          <a:effectRef idx="0">
+            <a:schemeClr val="accent2"/>
+          </a:effectRef>
+          <a:fontRef idx="minor">
+            <a:schemeClr val="lt1"/>
+          </a:fontRef>
+        </p:style>
+        <p:txBody>
+          <a:bodyPr/>
+          <a:lstStyle/>
+          <a:p>
+            <a:r>
+              <a:rPr lang="it-IT" dirty="0" err="1"/>
+              <a:t>Problem</a:t>
+            </a:r>
+            <a:r>
+              <a:rPr lang="it-IT" dirty="0"/>
+              <a:t> Scenario - Esempio</a:t>
+            </a:r>
+          </a:p>
+        </p:txBody>
+      </p:sp>
+      <p:sp>
+        <p:nvSpPr>
+          <p:cNvPr id="6" name="Segnaposto contenuto 5">
+            <a:extLst>
+              <a:ext uri="{FF2B5EF4-FFF2-40B4-BE49-F238E27FC236}">
+                <a16:creationId xmlns:a16="http://schemas.microsoft.com/office/drawing/2014/main" id="{050B5B15-5721-8D42-B792-B940345657C9}"/>
+              </a:ext>
+            </a:extLst>
+          </p:cNvPr>
+          <p:cNvSpPr>
+            <a:spLocks noGrp="1"/>
+          </p:cNvSpPr>
+          <p:nvPr>
+            <p:ph idx="1"/>
+          </p:nvPr>
+        </p:nvSpPr>
+        <p:spPr>
+          <a:xfrm>
+            <a:off x="628650" y="1825625"/>
+            <a:ext cx="7886700" cy="4530726"/>
+          </a:xfrm>
+        </p:spPr>
+        <p:txBody>
+          <a:bodyPr>
+            <a:noAutofit/>
+          </a:bodyPr>
+          <a:lstStyle/>
+          <a:p>
+            <a:pPr marL="0" indent="0">
+              <a:buNone/>
+            </a:pPr>
+            <a:r>
+              <a:rPr lang="it-IT" sz="1550" dirty="0"/>
+              <a:t>Sono le ore 18:00 e Davide è appena uscito dall’ufficio e deve rincasare. Dal momento che si sposta con i mezzi pubblici, è costretto ad attendere mezz’ora il pullman. Una volta rientrato, Davide è fisicamente e mentalmente stanco e quindi decide di passare un po’ di tempo con sua moglie. A seguito di una chiacchierata con quest’ultima, si rende conto che gli altri due suoi immobili (uno in Calabria e uno in Molise) sono inutilizzati per gran parte dell’anno e che quindi potrebbero essere messi a disposizione di altre persone in situazioni di emergenza. Il giorno successivo è sabato e il Comune del suo paese è aperto solo dal lunedì al venerdì; è quindi costretto ad aspettare che una nuova settimana inizi e prendere una giornata di permesso dal lavoro per informarsi al Comune. Il lunedì, dopo diverse ore di attesa, riesce a parlare con un responsabile della protezione civile, ed apprende che attualmente non esiste un modo per mettere a disposizione un proprio immobile. Dopo mezza giornata stressante spesa al comune ad attendere, torna a casa e decide di prendere iniziativa da solo: crea un gruppo su </a:t>
+            </a:r>
+            <a:r>
+              <a:rPr lang="it-IT" sz="1550" dirty="0" err="1"/>
+              <a:t>Facebook</a:t>
+            </a:r>
+            <a:r>
+              <a:rPr lang="it-IT" sz="1550" dirty="0"/>
+              <a:t> e mette un annuncio relativo ai suoi immobili per tutte le persone che si trovano in stato di emergenza.</a:t>
+            </a:r>
+          </a:p>
+          <a:p>
+            <a:pPr marL="0" indent="0">
+              <a:buNone/>
+            </a:pPr>
+            <a:r>
+              <a:rPr lang="it-IT" sz="1550" dirty="0"/>
+              <a:t>Purtroppo, diffondere la notizia della creazione del gruppo non è facile, e per forza di cose il numero di persone raggiunto non è elevato. </a:t>
+            </a:r>
+          </a:p>
+          <a:p>
+            <a:pPr marL="0" indent="0">
+              <a:buNone/>
+            </a:pPr>
+            <a:r>
+              <a:rPr lang="it-IT" sz="1550" dirty="0"/>
+              <a:t>Decide dunque di rivolgersi anche ad alcune associazioni presenti sul territorio che si occupano proprio di trovare una sistemazione a chi ne ha bisogno, ma purtroppo tali associazioni non sono né presenti ovunque né egualmente affidabili, e non è riuscito a trovarne una in Calabria.	</a:t>
+            </a:r>
+          </a:p>
+          <a:p>
+            <a:pPr marL="0" indent="0">
+              <a:buNone/>
+            </a:pPr>
+            <a:endParaRPr lang="it-IT" sz="1550" dirty="0"/>
+          </a:p>
+          <a:p>
+            <a:pPr marL="0" indent="0">
+              <a:buNone/>
+            </a:pPr>
+            <a:endParaRPr lang="it-IT" sz="1550" dirty="0"/>
+          </a:p>
+          <a:p>
+            <a:pPr marL="0" indent="0">
+              <a:buNone/>
+            </a:pPr>
+            <a:endParaRPr lang="it-IT" sz="1550" dirty="0"/>
+          </a:p>
+          <a:p>
+            <a:pPr marL="0" indent="0">
+              <a:buNone/>
+            </a:pPr>
+            <a:endParaRPr lang="it-IT" sz="1550" dirty="0"/>
+          </a:p>
+        </p:txBody>
+      </p:sp>
+    </p:spTree>
+    <p:extLst>
+      <p:ext uri="{BB962C8B-B14F-4D97-AF65-F5344CB8AC3E}">
+        <p14:creationId xmlns:p14="http://schemas.microsoft.com/office/powerpoint/2010/main" val="2918689011"/>
+      </p:ext>
+    </p:extLst>
+  </p:cSld>
+  <p:clrMapOvr>
+    <a:masterClrMapping/>
+  </p:clrMapOvr>
+</p:sld>
+</file>
+
+<file path=ppt/slides/slide17.xml><?xml version="1.0" encoding="utf-8"?>
+<p:sld xmlns:a="http://schemas.openxmlformats.org/drawingml/2006/main" xmlns:r="http://schemas.openxmlformats.org/officeDocument/2006/relationships" xmlns:p="http://schemas.openxmlformats.org/presentationml/2006/main">
+  <p:cSld>
+    <p:bg>
+      <p:bgPr>
+        <a:solidFill>
+          <a:schemeClr val="bg1"/>
+        </a:solidFill>
+        <a:effectLst/>
+      </p:bgPr>
+    </p:bg>
+    <p:spTree>
+      <p:nvGrpSpPr>
+        <p:cNvPr id="1" name=""/>
+        <p:cNvGrpSpPr/>
+        <p:nvPr/>
+      </p:nvGrpSpPr>
+      <p:grpSpPr>
+        <a:xfrm>
+          <a:off x="0" y="0"/>
+          <a:ext cx="0" cy="0"/>
+          <a:chOff x="0" y="0"/>
+          <a:chExt cx="0" cy="0"/>
+        </a:xfrm>
+      </p:grpSpPr>
+      <p:sp>
+        <p:nvSpPr>
+          <p:cNvPr id="2" name="Titolo 1">
+            <a:extLst>
+              <a:ext uri="{FF2B5EF4-FFF2-40B4-BE49-F238E27FC236}">
+                <a16:creationId xmlns:a16="http://schemas.microsoft.com/office/drawing/2014/main" id="{503931D8-D0CD-F34D-A8E4-4DBAF1645F4F}"/>
+              </a:ext>
+            </a:extLst>
+          </p:cNvPr>
+          <p:cNvSpPr>
+            <a:spLocks noGrp="1"/>
+          </p:cNvSpPr>
+          <p:nvPr>
+            <p:ph type="title"/>
+          </p:nvPr>
+        </p:nvSpPr>
+        <p:spPr>
+          <a:xfrm>
+            <a:off x="628650" y="365125"/>
+            <a:ext cx="7886700" cy="1325563"/>
+          </a:xfrm>
+        </p:spPr>
+        <p:style>
+          <a:lnRef idx="2">
+            <a:schemeClr val="accent2">
+              <a:shade val="50000"/>
+            </a:schemeClr>
+          </a:lnRef>
+          <a:fillRef idx="1">
+            <a:schemeClr val="accent2"/>
+          </a:fillRef>
+          <a:effectRef idx="0">
+            <a:schemeClr val="accent2"/>
+          </a:effectRef>
+          <a:fontRef idx="minor">
+            <a:schemeClr val="lt1"/>
+          </a:fontRef>
+        </p:style>
+        <p:txBody>
+          <a:bodyPr vert="horz" lIns="91440" tIns="45720" rIns="91440" bIns="45720" rtlCol="0" anchor="ctr">
+            <a:normAutofit/>
+          </a:bodyPr>
+          <a:lstStyle/>
+          <a:p>
+            <a:r>
+              <a:rPr lang="en-US" sz="4000" kern="1200" dirty="0">
+                <a:solidFill>
+                  <a:schemeClr val="bg1"/>
+                </a:solidFill>
+                <a:latin typeface="+mj-lt"/>
+                <a:ea typeface="+mj-ea"/>
+                <a:cs typeface="+mj-cs"/>
+              </a:rPr>
+              <a:t>Problem Scenario – Claim (</a:t>
+            </a:r>
+            <a:r>
+              <a:rPr lang="en-US" sz="4000" kern="1200" dirty="0" err="1">
+                <a:solidFill>
+                  <a:schemeClr val="bg1"/>
+                </a:solidFill>
+                <a:latin typeface="+mj-lt"/>
+                <a:ea typeface="+mj-ea"/>
+                <a:cs typeface="+mj-cs"/>
+              </a:rPr>
+              <a:t>Esempio</a:t>
+            </a:r>
+            <a:r>
+              <a:rPr lang="en-US" sz="4000" kern="1200" dirty="0">
+                <a:solidFill>
+                  <a:schemeClr val="bg1"/>
+                </a:solidFill>
+                <a:latin typeface="+mj-lt"/>
+                <a:ea typeface="+mj-ea"/>
+                <a:cs typeface="+mj-cs"/>
+              </a:rPr>
+              <a:t>)</a:t>
+            </a:r>
+          </a:p>
+        </p:txBody>
+      </p:sp>
+      <p:graphicFrame>
+        <p:nvGraphicFramePr>
+          <p:cNvPr id="8" name="Tabella 7">
+            <a:extLst>
+              <a:ext uri="{FF2B5EF4-FFF2-40B4-BE49-F238E27FC236}">
+                <a16:creationId xmlns:a16="http://schemas.microsoft.com/office/drawing/2014/main" id="{CDA74D4E-F245-3E47-A78F-96889A04B823}"/>
+              </a:ext>
+            </a:extLst>
+          </p:cNvPr>
+          <p:cNvGraphicFramePr>
+            <a:graphicFrameLocks noGrp="1"/>
+          </p:cNvGraphicFramePr>
+          <p:nvPr>
+            <p:extLst>
+              <p:ext uri="{D42A27DB-BD31-4B8C-83A1-F6EECF244321}">
+                <p14:modId xmlns:p14="http://schemas.microsoft.com/office/powerpoint/2010/main" val="526234496"/>
+              </p:ext>
+            </p:extLst>
+          </p:nvPr>
+        </p:nvGraphicFramePr>
+        <p:xfrm>
+          <a:off x="628650" y="1828799"/>
+          <a:ext cx="7886700" cy="4472998"/>
+        </p:xfrm>
+        <a:graphic>
+          <a:graphicData uri="http://schemas.openxmlformats.org/drawingml/2006/table">
+            <a:tbl>
+              <a:tblPr firstRow="1" firstCol="1" bandRow="1">
+                <a:tableStyleId>{5C22544A-7EE6-4342-B048-85BDC9FD1C3A}</a:tableStyleId>
+              </a:tblPr>
+              <a:tblGrid>
+                <a:gridCol w="2395904">
+                  <a:extLst>
+                    <a:ext uri="{9D8B030D-6E8A-4147-A177-3AD203B41FA5}">
+                      <a16:colId xmlns:a16="http://schemas.microsoft.com/office/drawing/2014/main" val="1318648402"/>
+                    </a:ext>
+                  </a:extLst>
+                </a:gridCol>
+                <a:gridCol w="5490796">
+                  <a:extLst>
+                    <a:ext uri="{9D8B030D-6E8A-4147-A177-3AD203B41FA5}">
+                      <a16:colId xmlns:a16="http://schemas.microsoft.com/office/drawing/2014/main" val="191658464"/>
+                    </a:ext>
+                  </a:extLst>
+                </a:gridCol>
+              </a:tblGrid>
+              <a:tr h="172368">
+                <a:tc>
+                  <a:txBody>
+                    <a:bodyPr/>
+                    <a:lstStyle/>
+                    <a:p>
+                      <a:pPr>
+                        <a:lnSpc>
+                          <a:spcPct val="107000"/>
+                        </a:lnSpc>
+                        <a:spcAft>
+                          <a:spcPts val="0"/>
+                        </a:spcAft>
+                      </a:pPr>
+                      <a:r>
+                        <a:rPr lang="it-IT" sz="900">
+                          <a:effectLst/>
+                        </a:rPr>
+                        <a:t>Situation features (Problem scenario 1)</a:t>
+                      </a:r>
+                      <a:endParaRPr lang="it-IT" sz="900">
+                        <a:effectLst/>
+                        <a:latin typeface="Calibri" panose="020F0502020204030204" pitchFamily="34" charset="0"/>
+                        <a:ea typeface="Calibri" panose="020F0502020204030204" pitchFamily="34" charset="0"/>
+                        <a:cs typeface="Times New Roman" panose="02020603050405020304" pitchFamily="18" charset="0"/>
+                      </a:endParaRPr>
+                    </a:p>
+                  </a:txBody>
+                  <a:tcPr marL="41498" marR="41498" marT="0" marB="0"/>
+                </a:tc>
+                <a:tc>
+                  <a:txBody>
+                    <a:bodyPr/>
+                    <a:lstStyle/>
+                    <a:p>
+                      <a:pPr>
+                        <a:lnSpc>
+                          <a:spcPct val="107000"/>
+                        </a:lnSpc>
+                        <a:spcAft>
+                          <a:spcPts val="0"/>
+                        </a:spcAft>
+                      </a:pPr>
+                      <a:r>
+                        <a:rPr lang="it-IT" sz="900">
+                          <a:effectLst/>
+                        </a:rPr>
+                        <a:t>Pro (+) e Contro (-)</a:t>
+                      </a:r>
+                      <a:endParaRPr lang="it-IT" sz="900">
+                        <a:effectLst/>
+                        <a:latin typeface="Calibri" panose="020F0502020204030204" pitchFamily="34" charset="0"/>
+                        <a:ea typeface="Calibri" panose="020F0502020204030204" pitchFamily="34" charset="0"/>
+                        <a:cs typeface="Times New Roman" panose="02020603050405020304" pitchFamily="18" charset="0"/>
+                      </a:endParaRPr>
+                    </a:p>
+                  </a:txBody>
+                  <a:tcPr marL="41498" marR="41498" marT="0" marB="0"/>
+                </a:tc>
+                <a:extLst>
+                  <a:ext uri="{0D108BD9-81ED-4DB2-BD59-A6C34878D82A}">
+                    <a16:rowId xmlns:a16="http://schemas.microsoft.com/office/drawing/2014/main" val="768626132"/>
+                  </a:ext>
+                </a:extLst>
+              </a:tr>
+              <a:tr h="1053531">
+                <a:tc>
+                  <a:txBody>
+                    <a:bodyPr/>
+                    <a:lstStyle/>
+                    <a:p>
+                      <a:pPr>
+                        <a:lnSpc>
+                          <a:spcPct val="107000"/>
+                        </a:lnSpc>
+                        <a:spcAft>
+                          <a:spcPts val="0"/>
+                        </a:spcAft>
+                      </a:pPr>
+                      <a:r>
+                        <a:rPr lang="it-IT" sz="1400" dirty="0">
+                          <a:effectLst/>
+                        </a:rPr>
+                        <a:t>Mettere a disposizione un immobile</a:t>
+                      </a:r>
+                      <a:endParaRPr lang="it-IT" sz="1400" dirty="0">
+                        <a:effectLst/>
+                        <a:latin typeface="Calibri" panose="020F0502020204030204" pitchFamily="34" charset="0"/>
+                        <a:ea typeface="Calibri" panose="020F0502020204030204" pitchFamily="34" charset="0"/>
+                        <a:cs typeface="Times New Roman" panose="02020603050405020304" pitchFamily="18" charset="0"/>
+                      </a:endParaRPr>
+                    </a:p>
+                  </a:txBody>
+                  <a:tcPr marL="41498" marR="41498" marT="0" marB="0"/>
+                </a:tc>
+                <a:tc>
+                  <a:txBody>
+                    <a:bodyPr/>
+                    <a:lstStyle/>
+                    <a:p>
+                      <a:pPr>
+                        <a:lnSpc>
+                          <a:spcPct val="107000"/>
+                        </a:lnSpc>
+                        <a:spcAft>
+                          <a:spcPts val="0"/>
+                        </a:spcAft>
+                      </a:pPr>
+                      <a:r>
+                        <a:rPr lang="it-IT" sz="1200" dirty="0">
+                          <a:effectLst/>
+                        </a:rPr>
+                        <a:t>(+) Davide può aiutare i cittadini che hanno bisogno di una casa per situazioni di emergenze</a:t>
+                      </a:r>
+                    </a:p>
+                    <a:p>
+                      <a:pPr>
+                        <a:lnSpc>
+                          <a:spcPct val="107000"/>
+                        </a:lnSpc>
+                        <a:spcAft>
+                          <a:spcPts val="0"/>
+                        </a:spcAft>
+                      </a:pPr>
+                      <a:r>
+                        <a:rPr lang="it-IT" sz="1200" dirty="0">
+                          <a:effectLst/>
+                        </a:rPr>
+                        <a:t>(+) Facilita il Comune nell’assegnazione di un alloggio ai nuclei familiari</a:t>
+                      </a:r>
+                    </a:p>
+                    <a:p>
+                      <a:pPr>
+                        <a:lnSpc>
+                          <a:spcPct val="107000"/>
+                        </a:lnSpc>
+                        <a:spcAft>
+                          <a:spcPts val="0"/>
+                        </a:spcAft>
+                      </a:pPr>
+                      <a:r>
+                        <a:rPr lang="it-IT" sz="1200" dirty="0">
+                          <a:effectLst/>
+                        </a:rPr>
+                        <a:t>(+) Maggiore confort e senso di sicurezza per le persone ospitate</a:t>
+                      </a:r>
+                    </a:p>
+                    <a:p>
+                      <a:pPr>
+                        <a:lnSpc>
+                          <a:spcPct val="107000"/>
+                        </a:lnSpc>
+                        <a:spcAft>
+                          <a:spcPts val="0"/>
+                        </a:spcAft>
+                      </a:pPr>
+                      <a:r>
+                        <a:rPr lang="it-IT" sz="1200" dirty="0">
+                          <a:effectLst/>
+                        </a:rPr>
+                        <a:t>(-) Davide potrebbe non sapere però fino a quando le persone devono restare nel suo alloggio</a:t>
+                      </a:r>
+                      <a:endParaRPr lang="it-IT" sz="1200" dirty="0">
+                        <a:effectLst/>
+                        <a:latin typeface="Calibri" panose="020F0502020204030204" pitchFamily="34" charset="0"/>
+                        <a:ea typeface="Calibri" panose="020F0502020204030204" pitchFamily="34" charset="0"/>
+                        <a:cs typeface="Times New Roman" panose="02020603050405020304" pitchFamily="18" charset="0"/>
+                      </a:endParaRPr>
+                    </a:p>
+                  </a:txBody>
+                  <a:tcPr marL="41498" marR="41498" marT="0" marB="0"/>
+                </a:tc>
+                <a:extLst>
+                  <a:ext uri="{0D108BD9-81ED-4DB2-BD59-A6C34878D82A}">
+                    <a16:rowId xmlns:a16="http://schemas.microsoft.com/office/drawing/2014/main" val="2841897614"/>
+                  </a:ext>
+                </a:extLst>
+              </a:tr>
+              <a:tr h="1494113">
+                <a:tc>
+                  <a:txBody>
+                    <a:bodyPr/>
+                    <a:lstStyle/>
+                    <a:p>
+                      <a:pPr>
+                        <a:lnSpc>
+                          <a:spcPct val="107000"/>
+                        </a:lnSpc>
+                        <a:spcAft>
+                          <a:spcPts val="0"/>
+                        </a:spcAft>
+                      </a:pPr>
+                      <a:r>
+                        <a:rPr lang="it-IT" sz="1400">
+                          <a:effectLst/>
+                        </a:rPr>
+                        <a:t>Recarsi personalmente al Comune per avere informazioni sulla messa a disposizione un immobile</a:t>
+                      </a:r>
+                      <a:endParaRPr lang="it-IT" sz="1400">
+                        <a:effectLst/>
+                        <a:latin typeface="Calibri" panose="020F0502020204030204" pitchFamily="34" charset="0"/>
+                        <a:ea typeface="Calibri" panose="020F0502020204030204" pitchFamily="34" charset="0"/>
+                        <a:cs typeface="Times New Roman" panose="02020603050405020304" pitchFamily="18" charset="0"/>
+                      </a:endParaRPr>
+                    </a:p>
+                  </a:txBody>
+                  <a:tcPr marL="41498" marR="41498" marT="0" marB="0"/>
+                </a:tc>
+                <a:tc>
+                  <a:txBody>
+                    <a:bodyPr/>
+                    <a:lstStyle/>
+                    <a:p>
+                      <a:pPr>
+                        <a:lnSpc>
+                          <a:spcPct val="107000"/>
+                        </a:lnSpc>
+                        <a:spcAft>
+                          <a:spcPts val="0"/>
+                        </a:spcAft>
+                      </a:pPr>
+                      <a:r>
+                        <a:rPr lang="it-IT" sz="1200" dirty="0">
+                          <a:effectLst/>
+                        </a:rPr>
+                        <a:t>(+) Si può ottenere una risposta alle proprie domande parlando con esperti del settore</a:t>
+                      </a:r>
+                    </a:p>
+                    <a:p>
+                      <a:pPr>
+                        <a:lnSpc>
+                          <a:spcPct val="107000"/>
+                        </a:lnSpc>
+                        <a:spcAft>
+                          <a:spcPts val="0"/>
+                        </a:spcAft>
+                      </a:pPr>
+                      <a:r>
+                        <a:rPr lang="it-IT" sz="1200" dirty="0">
+                          <a:effectLst/>
+                        </a:rPr>
+                        <a:t>(-) Davide avrebbe potuto utilizzare il suo tempo diversamente se fosse stato possibile informarsi online</a:t>
+                      </a:r>
+                    </a:p>
+                    <a:p>
+                      <a:pPr>
+                        <a:lnSpc>
+                          <a:spcPct val="107000"/>
+                        </a:lnSpc>
+                        <a:spcAft>
+                          <a:spcPts val="0"/>
+                        </a:spcAft>
+                      </a:pPr>
+                      <a:r>
+                        <a:rPr lang="it-IT" sz="1200" dirty="0">
+                          <a:effectLst/>
+                        </a:rPr>
+                        <a:t>(-) Il Comune non è sempre aperto e quindi Davide è costretto a saltare il lavoro</a:t>
+                      </a:r>
+                    </a:p>
+                    <a:p>
+                      <a:pPr>
+                        <a:lnSpc>
+                          <a:spcPct val="107000"/>
+                        </a:lnSpc>
+                        <a:spcAft>
+                          <a:spcPts val="0"/>
+                        </a:spcAft>
+                      </a:pPr>
+                      <a:r>
+                        <a:rPr lang="it-IT" sz="1200" dirty="0">
+                          <a:effectLst/>
+                        </a:rPr>
+                        <a:t>(-) Il comune non ha informazioni da dargli al riguardo: mettere a disposizione un immobile in modo ufficiale non è attualmente possibile!</a:t>
+                      </a:r>
+                    </a:p>
+                    <a:p>
+                      <a:pPr>
+                        <a:lnSpc>
+                          <a:spcPct val="107000"/>
+                        </a:lnSpc>
+                        <a:spcAft>
+                          <a:spcPts val="0"/>
+                        </a:spcAft>
+                      </a:pPr>
+                      <a:r>
+                        <a:rPr lang="it-IT" sz="900" dirty="0">
+                          <a:effectLst/>
+                        </a:rPr>
+                        <a:t> </a:t>
+                      </a:r>
+                      <a:endParaRPr lang="it-IT" sz="900" dirty="0">
+                        <a:effectLst/>
+                        <a:latin typeface="Calibri" panose="020F0502020204030204" pitchFamily="34" charset="0"/>
+                        <a:ea typeface="Calibri" panose="020F0502020204030204" pitchFamily="34" charset="0"/>
+                        <a:cs typeface="Times New Roman" panose="02020603050405020304" pitchFamily="18" charset="0"/>
+                      </a:endParaRPr>
+                    </a:p>
+                  </a:txBody>
+                  <a:tcPr marL="41498" marR="41498" marT="0" marB="0"/>
+                </a:tc>
+                <a:extLst>
+                  <a:ext uri="{0D108BD9-81ED-4DB2-BD59-A6C34878D82A}">
+                    <a16:rowId xmlns:a16="http://schemas.microsoft.com/office/drawing/2014/main" val="474426331"/>
+                  </a:ext>
+                </a:extLst>
+              </a:tr>
+              <a:tr h="1640974">
+                <a:tc>
+                  <a:txBody>
+                    <a:bodyPr/>
+                    <a:lstStyle/>
+                    <a:p>
+                      <a:pPr>
+                        <a:lnSpc>
+                          <a:spcPct val="107000"/>
+                        </a:lnSpc>
+                        <a:spcAft>
+                          <a:spcPts val="0"/>
+                        </a:spcAft>
+                      </a:pPr>
+                      <a:r>
+                        <a:rPr lang="it-IT" sz="1400" dirty="0">
+                          <a:effectLst/>
+                        </a:rPr>
+                        <a:t>Messa a disposizione di un’immobile tramite un gruppo </a:t>
+                      </a:r>
+                      <a:r>
+                        <a:rPr lang="it-IT" sz="1400" dirty="0" err="1">
+                          <a:effectLst/>
+                        </a:rPr>
+                        <a:t>Facebook</a:t>
+                      </a:r>
+                      <a:endParaRPr lang="it-IT" sz="1400" dirty="0">
+                        <a:effectLst/>
+                        <a:latin typeface="Calibri" panose="020F0502020204030204" pitchFamily="34" charset="0"/>
+                        <a:ea typeface="Calibri" panose="020F0502020204030204" pitchFamily="34" charset="0"/>
+                        <a:cs typeface="Times New Roman" panose="02020603050405020304" pitchFamily="18" charset="0"/>
+                      </a:endParaRPr>
+                    </a:p>
+                  </a:txBody>
+                  <a:tcPr marL="41498" marR="41498" marT="0" marB="0"/>
+                </a:tc>
+                <a:tc>
+                  <a:txBody>
+                    <a:bodyPr/>
+                    <a:lstStyle/>
+                    <a:p>
+                      <a:pPr>
+                        <a:lnSpc>
+                          <a:spcPct val="107000"/>
+                        </a:lnSpc>
+                        <a:spcAft>
+                          <a:spcPts val="0"/>
+                        </a:spcAft>
+                      </a:pPr>
+                      <a:r>
+                        <a:rPr lang="it-IT" sz="1200" dirty="0">
+                          <a:effectLst/>
+                        </a:rPr>
+                        <a:t>(+) Si utilizza una piattaforma che gran parte delle persone conosce</a:t>
+                      </a:r>
+                    </a:p>
+                    <a:p>
+                      <a:pPr>
+                        <a:lnSpc>
+                          <a:spcPct val="107000"/>
+                        </a:lnSpc>
+                        <a:spcAft>
+                          <a:spcPts val="0"/>
+                        </a:spcAft>
+                      </a:pPr>
+                      <a:r>
+                        <a:rPr lang="it-IT" sz="1200" dirty="0">
+                          <a:effectLst/>
+                        </a:rPr>
+                        <a:t>(-) Rischia di essere dispersivo</a:t>
+                      </a:r>
+                    </a:p>
+                    <a:p>
+                      <a:pPr>
+                        <a:lnSpc>
+                          <a:spcPct val="107000"/>
+                        </a:lnSpc>
+                        <a:spcAft>
+                          <a:spcPts val="0"/>
+                        </a:spcAft>
+                      </a:pPr>
+                      <a:r>
+                        <a:rPr lang="it-IT" sz="1200" dirty="0">
+                          <a:effectLst/>
+                        </a:rPr>
+                        <a:t>(-) Sarà difficile rendere il gruppo abbastanza noto da fargli avere una reale utilità</a:t>
+                      </a:r>
+                    </a:p>
+                    <a:p>
+                      <a:pPr>
+                        <a:lnSpc>
+                          <a:spcPct val="107000"/>
+                        </a:lnSpc>
+                        <a:spcAft>
+                          <a:spcPts val="0"/>
+                        </a:spcAft>
+                      </a:pPr>
+                      <a:r>
+                        <a:rPr lang="it-IT" sz="1200" dirty="0">
+                          <a:effectLst/>
+                        </a:rPr>
+                        <a:t>(-) La responsabilità di trovare una sistemazione spetta ai singoli cittadini, piuttosto che alla protezione civile</a:t>
+                      </a:r>
+                    </a:p>
+                    <a:p>
+                      <a:pPr>
+                        <a:lnSpc>
+                          <a:spcPct val="107000"/>
+                        </a:lnSpc>
+                        <a:spcAft>
+                          <a:spcPts val="0"/>
+                        </a:spcAft>
+                      </a:pPr>
+                      <a:r>
+                        <a:rPr lang="it-IT" sz="1200" dirty="0">
+                          <a:effectLst/>
+                        </a:rPr>
+                        <a:t>(-) Difficoltà organizzative nella cessione effettiva degli immobili</a:t>
+                      </a:r>
+                    </a:p>
+                    <a:p>
+                      <a:pPr>
+                        <a:lnSpc>
+                          <a:spcPct val="107000"/>
+                        </a:lnSpc>
+                        <a:spcAft>
+                          <a:spcPts val="0"/>
+                        </a:spcAft>
+                      </a:pPr>
+                      <a:r>
+                        <a:rPr lang="it-IT" sz="1200" dirty="0">
+                          <a:effectLst/>
+                        </a:rPr>
+                        <a:t>(-) Se il cittadino si sposta in un alloggio temporaneo reperito tramite </a:t>
+                      </a:r>
+                      <a:r>
+                        <a:rPr lang="it-IT" sz="1200" dirty="0" err="1">
+                          <a:effectLst/>
+                        </a:rPr>
+                        <a:t>Facebook</a:t>
+                      </a:r>
+                      <a:r>
+                        <a:rPr lang="it-IT" sz="1200" dirty="0">
+                          <a:effectLst/>
+                        </a:rPr>
+                        <a:t>, le autorità rischiano di non sapere dove si trova</a:t>
+                      </a:r>
+                      <a:endParaRPr lang="it-IT" sz="1200" dirty="0">
+                        <a:effectLst/>
+                        <a:latin typeface="Calibri" panose="020F0502020204030204" pitchFamily="34" charset="0"/>
+                        <a:ea typeface="Calibri" panose="020F0502020204030204" pitchFamily="34" charset="0"/>
+                        <a:cs typeface="Times New Roman" panose="02020603050405020304" pitchFamily="18" charset="0"/>
+                      </a:endParaRPr>
+                    </a:p>
+                  </a:txBody>
+                  <a:tcPr marL="41498" marR="41498" marT="0" marB="0"/>
+                </a:tc>
+                <a:extLst>
+                  <a:ext uri="{0D108BD9-81ED-4DB2-BD59-A6C34878D82A}">
+                    <a16:rowId xmlns:a16="http://schemas.microsoft.com/office/drawing/2014/main" val="2932587765"/>
+                  </a:ext>
+                </a:extLst>
+              </a:tr>
+            </a:tbl>
+          </a:graphicData>
+        </a:graphic>
+      </p:graphicFrame>
+    </p:spTree>
+    <p:extLst>
+      <p:ext uri="{BB962C8B-B14F-4D97-AF65-F5344CB8AC3E}">
+        <p14:creationId xmlns:p14="http://schemas.microsoft.com/office/powerpoint/2010/main" val="4236249808"/>
+      </p:ext>
+    </p:extLst>
+  </p:cSld>
+  <p:clrMapOvr>
+    <a:masterClrMapping/>
+  </p:clrMapOvr>
+</p:sld>
+</file>
+
+<file path=ppt/slides/slide18.xml><?xml version="1.0" encoding="utf-8"?>
+<p:sld xmlns:a="http://schemas.openxmlformats.org/drawingml/2006/main" xmlns:r="http://schemas.openxmlformats.org/officeDocument/2006/relationships" xmlns:p="http://schemas.openxmlformats.org/presentationml/2006/main">
+  <p:cSld>
+    <p:spTree>
+      <p:nvGrpSpPr>
+        <p:cNvPr id="1" name=""/>
+        <p:cNvGrpSpPr/>
+        <p:nvPr/>
+      </p:nvGrpSpPr>
+      <p:grpSpPr>
+        <a:xfrm>
+          <a:off x="0" y="0"/>
+          <a:ext cx="0" cy="0"/>
+          <a:chOff x="0" y="0"/>
+          <a:chExt cx="0" cy="0"/>
+        </a:xfrm>
+      </p:grpSpPr>
+      <p:sp>
+        <p:nvSpPr>
+          <p:cNvPr id="2" name="Titolo 1">
+            <a:extLst>
+              <a:ext uri="{FF2B5EF4-FFF2-40B4-BE49-F238E27FC236}">
+                <a16:creationId xmlns:a16="http://schemas.microsoft.com/office/drawing/2014/main" id="{503931D8-D0CD-F34D-A8E4-4DBAF1645F4F}"/>
+              </a:ext>
+            </a:extLst>
+          </p:cNvPr>
+          <p:cNvSpPr>
+            <a:spLocks noGrp="1"/>
+          </p:cNvSpPr>
+          <p:nvPr>
+            <p:ph type="title"/>
+          </p:nvPr>
+        </p:nvSpPr>
+        <p:spPr/>
+        <p:style>
+          <a:lnRef idx="2">
+            <a:schemeClr val="accent2">
+              <a:shade val="50000"/>
+            </a:schemeClr>
+          </a:lnRef>
+          <a:fillRef idx="1">
+            <a:schemeClr val="accent2"/>
+          </a:fillRef>
+          <a:effectRef idx="0">
+            <a:schemeClr val="accent2"/>
+          </a:effectRef>
+          <a:fontRef idx="minor">
+            <a:schemeClr val="lt1"/>
+          </a:fontRef>
+        </p:style>
+        <p:txBody>
+          <a:bodyPr/>
+          <a:lstStyle/>
+          <a:p>
+            <a:r>
+              <a:rPr lang="it-IT" dirty="0"/>
+              <a:t>Requisiti Funzionali</a:t>
+            </a:r>
+          </a:p>
+        </p:txBody>
+      </p:sp>
+      <p:sp>
+        <p:nvSpPr>
+          <p:cNvPr id="6" name="Segnaposto contenuto 5">
+            <a:extLst>
+              <a:ext uri="{FF2B5EF4-FFF2-40B4-BE49-F238E27FC236}">
+                <a16:creationId xmlns:a16="http://schemas.microsoft.com/office/drawing/2014/main" id="{050B5B15-5721-8D42-B792-B940345657C9}"/>
+              </a:ext>
+            </a:extLst>
+          </p:cNvPr>
+          <p:cNvSpPr>
+            <a:spLocks noGrp="1"/>
+          </p:cNvSpPr>
+          <p:nvPr>
+            <p:ph idx="1"/>
+          </p:nvPr>
+        </p:nvSpPr>
+        <p:spPr>
+          <a:xfrm>
+            <a:off x="628650" y="1825625"/>
+            <a:ext cx="7886700" cy="4530726"/>
+          </a:xfrm>
+        </p:spPr>
+        <p:txBody>
+          <a:bodyPr>
+            <a:noAutofit/>
+          </a:bodyPr>
+          <a:lstStyle/>
+          <a:p>
+            <a:r>
+              <a:rPr lang="it-IT" sz="1400" dirty="0"/>
+              <a:t>Il sito web </a:t>
+            </a:r>
+            <a:r>
+              <a:rPr lang="it-IT" sz="1400" b="1" dirty="0"/>
+              <a:t>deve</a:t>
+            </a:r>
+            <a:r>
+              <a:rPr lang="it-IT" sz="1400" dirty="0"/>
+              <a:t> permettere agli utenti che posseggono uno o più immobili, di metterli a disposizione delle persone che si ritrovano in una situazione di emergenza;</a:t>
+            </a:r>
+          </a:p>
+          <a:p>
+            <a:r>
+              <a:rPr lang="it-IT" sz="1400" dirty="0"/>
+              <a:t>Il sito web </a:t>
+            </a:r>
+            <a:r>
+              <a:rPr lang="it-IT" sz="1400" b="1" dirty="0"/>
+              <a:t>deve</a:t>
+            </a:r>
+            <a:r>
+              <a:rPr lang="it-IT" sz="1400" dirty="0"/>
+              <a:t> permettere agli utenti che posseggono uno o più immobili, di decidere il periodo in cui è possibile utilizzare l’abitazione, tenendo conto che la data può essere prorogata ma non anticipata;</a:t>
+            </a:r>
+          </a:p>
+          <a:p>
+            <a:r>
+              <a:rPr lang="it-IT" sz="1400" dirty="0"/>
+              <a:t>Il sito web </a:t>
+            </a:r>
+            <a:r>
+              <a:rPr lang="it-IT" sz="1400" b="1" dirty="0"/>
+              <a:t>deve</a:t>
+            </a:r>
+            <a:r>
+              <a:rPr lang="it-IT" sz="1400" dirty="0"/>
+              <a:t> permettere agli utenti di visualizzare tutte le informazioni relative agli immobili inseriti e al loro stato di assegnazione;</a:t>
+            </a:r>
+          </a:p>
+          <a:p>
+            <a:r>
+              <a:rPr lang="it-IT" sz="1400" dirty="0"/>
+              <a:t>Il sito web </a:t>
+            </a:r>
+            <a:r>
+              <a:rPr lang="it-IT" sz="1400" b="1" dirty="0"/>
+              <a:t>deve</a:t>
+            </a:r>
+            <a:r>
+              <a:rPr lang="it-IT" sz="1400" dirty="0"/>
+              <a:t> permettere agli operatori della protezione civile di assegnare un immobile alle persone che ne hanno bisogno;</a:t>
+            </a:r>
+          </a:p>
+          <a:p>
+            <a:r>
+              <a:rPr lang="it-IT" sz="1400" dirty="0"/>
+              <a:t>Il sito web </a:t>
+            </a:r>
+            <a:r>
+              <a:rPr lang="it-IT" sz="1400" b="1" dirty="0"/>
+              <a:t>deve</a:t>
+            </a:r>
+            <a:r>
+              <a:rPr lang="it-IT" sz="1400" dirty="0"/>
+              <a:t> permettere agli operatori della protezione civile di trovare la miglior sistemazione possibile vicina alla casa che un nucleo familiare ha lasciato; </a:t>
+            </a:r>
+          </a:p>
+          <a:p>
+            <a:r>
+              <a:rPr lang="it-IT" sz="1400" dirty="0"/>
+              <a:t>Il sito web </a:t>
+            </a:r>
+            <a:r>
+              <a:rPr lang="it-IT" sz="1400" b="1" dirty="0"/>
+              <a:t>deve</a:t>
+            </a:r>
+            <a:r>
+              <a:rPr lang="it-IT" sz="1400" dirty="0"/>
+              <a:t> permettere agli operatori della protezione civile di inserire una lista di persone che hanno bisogno di una sistemazione temporanea.</a:t>
+            </a:r>
+          </a:p>
+          <a:p>
+            <a:r>
+              <a:rPr lang="it-IT" sz="1400" dirty="0"/>
+              <a:t>Il sito web </a:t>
+            </a:r>
+            <a:r>
+              <a:rPr lang="it-IT" sz="1400" b="1" dirty="0"/>
+              <a:t>deve</a:t>
+            </a:r>
+            <a:r>
+              <a:rPr lang="it-IT" sz="1400" dirty="0"/>
+              <a:t> permettere agli operatori della protezione civile di visualizzare la sistemazione provvisoria attuale di ciascun cittadino coinvolto</a:t>
+            </a:r>
+          </a:p>
+          <a:p>
+            <a:r>
+              <a:rPr lang="it-IT" sz="1400" dirty="0"/>
+              <a:t>Il sito web </a:t>
+            </a:r>
+            <a:r>
+              <a:rPr lang="it-IT" sz="1400" b="1" dirty="0"/>
+              <a:t>deve</a:t>
+            </a:r>
+            <a:r>
+              <a:rPr lang="it-IT" sz="1400" dirty="0"/>
+              <a:t> permettere agli operatori della protezione civile di visualizzare in ogni momento tutti i dettagli relativi ad un immobile</a:t>
+            </a:r>
+          </a:p>
+          <a:p>
+            <a:r>
+              <a:rPr lang="it-IT" sz="1400" dirty="0"/>
+              <a:t>Il sito web </a:t>
+            </a:r>
+            <a:r>
+              <a:rPr lang="it-IT" sz="1400" b="1" dirty="0"/>
+              <a:t>deve</a:t>
+            </a:r>
+            <a:r>
+              <a:rPr lang="it-IT" sz="1400" dirty="0"/>
+              <a:t> permettere agli operatori della protezione civile di visualizzare e gestire gli occupanti di ogni immobile </a:t>
+            </a:r>
+          </a:p>
+          <a:p>
+            <a:pPr marL="0" indent="0">
+              <a:buNone/>
+            </a:pPr>
+            <a:endParaRPr lang="it-IT" sz="1400" dirty="0"/>
+          </a:p>
+          <a:p>
+            <a:pPr marL="0" indent="0">
+              <a:buNone/>
+            </a:pPr>
+            <a:endParaRPr lang="it-IT" sz="1400" dirty="0"/>
+          </a:p>
+        </p:txBody>
+      </p:sp>
+    </p:spTree>
+    <p:extLst>
+      <p:ext uri="{BB962C8B-B14F-4D97-AF65-F5344CB8AC3E}">
+        <p14:creationId xmlns:p14="http://schemas.microsoft.com/office/powerpoint/2010/main" val="1811035368"/>
+      </p:ext>
+    </p:extLst>
+  </p:cSld>
+  <p:clrMapOvr>
+    <a:masterClrMapping/>
+  </p:clrMapOvr>
+</p:sld>
+</file>
+
+<file path=ppt/slides/slide19.xml><?xml version="1.0" encoding="utf-8"?>
 <p:sld xmlns:a="http://schemas.openxmlformats.org/drawingml/2006/main" xmlns:r="http://schemas.openxmlformats.org/officeDocument/2006/relationships" xmlns:p="http://schemas.openxmlformats.org/presentationml/2006/main">
   <p:cSld>
     <p:spTree>
@@ -3638,7 +6437,87 @@
             <a:pPr algn="ctr"/>
             <a:r>
               <a:rPr lang="it-IT" sz="5400" dirty="0"/>
-              <a:t>ANALISI DEL PROBLEMA</a:t>
+              <a:t>Design</a:t>
+            </a:r>
+          </a:p>
+        </p:txBody>
+      </p:sp>
+    </p:spTree>
+    <p:extLst>
+      <p:ext uri="{BB962C8B-B14F-4D97-AF65-F5344CB8AC3E}">
+        <p14:creationId xmlns:p14="http://schemas.microsoft.com/office/powerpoint/2010/main" val="3523188281"/>
+      </p:ext>
+    </p:extLst>
+  </p:cSld>
+  <p:clrMapOvr>
+    <a:masterClrMapping/>
+  </p:clrMapOvr>
+</p:sld>
+</file>
+
+<file path=ppt/slides/slide2.xml><?xml version="1.0" encoding="utf-8"?>
+<p:sld xmlns:a="http://schemas.openxmlformats.org/drawingml/2006/main" xmlns:r="http://schemas.openxmlformats.org/officeDocument/2006/relationships" xmlns:p="http://schemas.openxmlformats.org/presentationml/2006/main">
+  <p:cSld>
+    <p:spTree>
+      <p:nvGrpSpPr>
+        <p:cNvPr id="1" name=""/>
+        <p:cNvGrpSpPr/>
+        <p:nvPr/>
+      </p:nvGrpSpPr>
+      <p:grpSpPr>
+        <a:xfrm>
+          <a:off x="0" y="0"/>
+          <a:ext cx="0" cy="0"/>
+          <a:chOff x="0" y="0"/>
+          <a:chExt cx="0" cy="0"/>
+        </a:xfrm>
+      </p:grpSpPr>
+      <p:sp>
+        <p:nvSpPr>
+          <p:cNvPr id="2" name="Titolo 1">
+            <a:extLst>
+              <a:ext uri="{FF2B5EF4-FFF2-40B4-BE49-F238E27FC236}">
+                <a16:creationId xmlns:a16="http://schemas.microsoft.com/office/drawing/2014/main" id="{7E669C8F-6459-5142-B063-FCC94FBA774E}"/>
+              </a:ext>
+            </a:extLst>
+          </p:cNvPr>
+          <p:cNvSpPr>
+            <a:spLocks noGrp="1"/>
+          </p:cNvSpPr>
+          <p:nvPr>
+            <p:ph type="title"/>
+          </p:nvPr>
+        </p:nvSpPr>
+        <p:spPr>
+          <a:xfrm>
+            <a:off x="628650" y="2766218"/>
+            <a:ext cx="7886700" cy="1325563"/>
+          </a:xfrm>
+        </p:spPr>
+        <p:style>
+          <a:lnRef idx="0">
+            <a:schemeClr val="accent2"/>
+          </a:lnRef>
+          <a:fillRef idx="3">
+            <a:schemeClr val="accent2"/>
+          </a:fillRef>
+          <a:effectRef idx="3">
+            <a:schemeClr val="accent2"/>
+          </a:effectRef>
+          <a:fontRef idx="minor">
+            <a:schemeClr val="lt1"/>
+          </a:fontRef>
+        </p:style>
+        <p:txBody>
+          <a:bodyPr anchor="ctr">
+            <a:normAutofit/>
+          </a:bodyPr>
+          <a:lstStyle/>
+          <a:p>
+            <a:pPr algn="ctr"/>
+            <a:r>
+              <a:rPr lang="it-IT" sz="5400" dirty="0"/>
+              <a:t>Analisi del Problema</a:t>
             </a:r>
           </a:p>
         </p:txBody>
@@ -3769,6 +6648,765 @@
     <p:extLst>
       <p:ext uri="{BB962C8B-B14F-4D97-AF65-F5344CB8AC3E}">
         <p14:creationId xmlns:p14="http://schemas.microsoft.com/office/powerpoint/2010/main" val="705998727"/>
+      </p:ext>
+    </p:extLst>
+  </p:cSld>
+  <p:clrMapOvr>
+    <a:masterClrMapping/>
+  </p:clrMapOvr>
+</p:sld>
+</file>
+
+<file path=ppt/slides/slide4.xml><?xml version="1.0" encoding="utf-8"?>
+<p:sld xmlns:a="http://schemas.openxmlformats.org/drawingml/2006/main" xmlns:r="http://schemas.openxmlformats.org/officeDocument/2006/relationships" xmlns:p="http://schemas.openxmlformats.org/presentationml/2006/main">
+  <p:cSld>
+    <p:spTree>
+      <p:nvGrpSpPr>
+        <p:cNvPr id="1" name=""/>
+        <p:cNvGrpSpPr/>
+        <p:nvPr/>
+      </p:nvGrpSpPr>
+      <p:grpSpPr>
+        <a:xfrm>
+          <a:off x="0" y="0"/>
+          <a:ext cx="0" cy="0"/>
+          <a:chOff x="0" y="0"/>
+          <a:chExt cx="0" cy="0"/>
+        </a:xfrm>
+      </p:grpSpPr>
+      <p:sp>
+        <p:nvSpPr>
+          <p:cNvPr id="2" name="Titolo 1">
+            <a:extLst>
+              <a:ext uri="{FF2B5EF4-FFF2-40B4-BE49-F238E27FC236}">
+                <a16:creationId xmlns:a16="http://schemas.microsoft.com/office/drawing/2014/main" id="{503931D8-D0CD-F34D-A8E4-4DBAF1645F4F}"/>
+              </a:ext>
+            </a:extLst>
+          </p:cNvPr>
+          <p:cNvSpPr>
+            <a:spLocks noGrp="1"/>
+          </p:cNvSpPr>
+          <p:nvPr>
+            <p:ph type="title"/>
+          </p:nvPr>
+        </p:nvSpPr>
+        <p:spPr/>
+        <p:style>
+          <a:lnRef idx="2">
+            <a:schemeClr val="accent2">
+              <a:shade val="50000"/>
+            </a:schemeClr>
+          </a:lnRef>
+          <a:fillRef idx="1">
+            <a:schemeClr val="accent2"/>
+          </a:fillRef>
+          <a:effectRef idx="0">
+            <a:schemeClr val="accent2"/>
+          </a:effectRef>
+          <a:fontRef idx="minor">
+            <a:schemeClr val="lt1"/>
+          </a:fontRef>
+        </p:style>
+        <p:txBody>
+          <a:bodyPr/>
+          <a:lstStyle/>
+          <a:p>
+            <a:r>
+              <a:rPr lang="it-IT" dirty="0"/>
+              <a:t>Il Problema</a:t>
+            </a:r>
+          </a:p>
+        </p:txBody>
+      </p:sp>
+      <p:sp>
+        <p:nvSpPr>
+          <p:cNvPr id="3" name="Segnaposto contenuto 2">
+            <a:extLst>
+              <a:ext uri="{FF2B5EF4-FFF2-40B4-BE49-F238E27FC236}">
+                <a16:creationId xmlns:a16="http://schemas.microsoft.com/office/drawing/2014/main" id="{1DBA8A83-B8D2-8842-A6B1-A1BD5E52014F}"/>
+              </a:ext>
+            </a:extLst>
+          </p:cNvPr>
+          <p:cNvSpPr>
+            <a:spLocks noGrp="1"/>
+          </p:cNvSpPr>
+          <p:nvPr>
+            <p:ph idx="1"/>
+          </p:nvPr>
+        </p:nvSpPr>
+        <p:spPr/>
+        <p:txBody>
+          <a:bodyPr>
+            <a:normAutofit fontScale="92500"/>
+          </a:bodyPr>
+          <a:lstStyle/>
+          <a:p>
+            <a:r>
+              <a:rPr lang="it-IT" dirty="0"/>
+              <a:t>Nella gestione di tali situazioni, sopraggiungono diversi problemi</a:t>
+            </a:r>
+          </a:p>
+          <a:p>
+            <a:pPr lvl="1"/>
+            <a:r>
+              <a:rPr lang="it-IT" dirty="0"/>
+              <a:t>Bisogna effettuare il censimento della popolazione colpita </a:t>
+            </a:r>
+          </a:p>
+          <a:p>
+            <a:pPr lvl="1"/>
+            <a:r>
+              <a:rPr lang="it-IT" dirty="0"/>
+              <a:t>Sebbene la Protezione Civile abbia una lista di hotel disponibili ad ospitare le persone, spesso è comunque necessaria una prima fase in cui i cittadini vengono smistati in tendopoli, che vanno allestite in maniera rapidissima</a:t>
+            </a:r>
+          </a:p>
+          <a:p>
+            <a:pPr lvl="1"/>
+            <a:r>
+              <a:rPr lang="it-IT" dirty="0"/>
+              <a:t>Il sindaco del Comune, che in situazione di emergenza diventa capo della Protezione Civile, può risalire ad una lista di immobili liberi in possesso di altri cittadini, che eventualmente possono essere contattati per chiedere loro se sono disponibili a metterli a disposizione della popolazione colpita</a:t>
+            </a:r>
+          </a:p>
+          <a:p>
+            <a:pPr lvl="1"/>
+            <a:endParaRPr lang="it-IT" dirty="0"/>
+          </a:p>
+          <a:p>
+            <a:pPr lvl="1"/>
+            <a:endParaRPr lang="it-IT" dirty="0"/>
+          </a:p>
+          <a:p>
+            <a:pPr lvl="1"/>
+            <a:endParaRPr lang="it-IT" dirty="0"/>
+          </a:p>
+        </p:txBody>
+      </p:sp>
+    </p:spTree>
+    <p:extLst>
+      <p:ext uri="{BB962C8B-B14F-4D97-AF65-F5344CB8AC3E}">
+        <p14:creationId xmlns:p14="http://schemas.microsoft.com/office/powerpoint/2010/main" val="67222406"/>
+      </p:ext>
+    </p:extLst>
+  </p:cSld>
+  <p:clrMapOvr>
+    <a:masterClrMapping/>
+  </p:clrMapOvr>
+</p:sld>
+</file>
+
+<file path=ppt/slides/slide5.xml><?xml version="1.0" encoding="utf-8"?>
+<p:sld xmlns:a="http://schemas.openxmlformats.org/drawingml/2006/main" xmlns:r="http://schemas.openxmlformats.org/officeDocument/2006/relationships" xmlns:p="http://schemas.openxmlformats.org/presentationml/2006/main">
+  <p:cSld>
+    <p:spTree>
+      <p:nvGrpSpPr>
+        <p:cNvPr id="1" name=""/>
+        <p:cNvGrpSpPr/>
+        <p:nvPr/>
+      </p:nvGrpSpPr>
+      <p:grpSpPr>
+        <a:xfrm>
+          <a:off x="0" y="0"/>
+          <a:ext cx="0" cy="0"/>
+          <a:chOff x="0" y="0"/>
+          <a:chExt cx="0" cy="0"/>
+        </a:xfrm>
+      </p:grpSpPr>
+      <p:sp>
+        <p:nvSpPr>
+          <p:cNvPr id="2" name="Titolo 1">
+            <a:extLst>
+              <a:ext uri="{FF2B5EF4-FFF2-40B4-BE49-F238E27FC236}">
+                <a16:creationId xmlns:a16="http://schemas.microsoft.com/office/drawing/2014/main" id="{503931D8-D0CD-F34D-A8E4-4DBAF1645F4F}"/>
+              </a:ext>
+            </a:extLst>
+          </p:cNvPr>
+          <p:cNvSpPr>
+            <a:spLocks noGrp="1"/>
+          </p:cNvSpPr>
+          <p:nvPr>
+            <p:ph type="title"/>
+          </p:nvPr>
+        </p:nvSpPr>
+        <p:spPr/>
+        <p:style>
+          <a:lnRef idx="2">
+            <a:schemeClr val="accent2">
+              <a:shade val="50000"/>
+            </a:schemeClr>
+          </a:lnRef>
+          <a:fillRef idx="1">
+            <a:schemeClr val="accent2"/>
+          </a:fillRef>
+          <a:effectRef idx="0">
+            <a:schemeClr val="accent2"/>
+          </a:effectRef>
+          <a:fontRef idx="minor">
+            <a:schemeClr val="lt1"/>
+          </a:fontRef>
+        </p:style>
+        <p:txBody>
+          <a:bodyPr/>
+          <a:lstStyle/>
+          <a:p>
+            <a:r>
+              <a:rPr lang="it-IT" dirty="0"/>
+              <a:t>Il Problema</a:t>
+            </a:r>
+          </a:p>
+        </p:txBody>
+      </p:sp>
+      <p:sp>
+        <p:nvSpPr>
+          <p:cNvPr id="3" name="Segnaposto contenuto 2">
+            <a:extLst>
+              <a:ext uri="{FF2B5EF4-FFF2-40B4-BE49-F238E27FC236}">
+                <a16:creationId xmlns:a16="http://schemas.microsoft.com/office/drawing/2014/main" id="{1DBA8A83-B8D2-8842-A6B1-A1BD5E52014F}"/>
+              </a:ext>
+            </a:extLst>
+          </p:cNvPr>
+          <p:cNvSpPr>
+            <a:spLocks noGrp="1"/>
+          </p:cNvSpPr>
+          <p:nvPr>
+            <p:ph idx="1"/>
+          </p:nvPr>
+        </p:nvSpPr>
+        <p:spPr/>
+        <p:txBody>
+          <a:bodyPr>
+            <a:normAutofit/>
+          </a:bodyPr>
+          <a:lstStyle/>
+          <a:p>
+            <a:r>
+              <a:rPr lang="it-IT" dirty="0"/>
+              <a:t>Attualmente, un cittadino che volesse preventivamente mettere a disposizione di altre persone un proprio immobile per situazioni di emergenza, non può farlo, in quanto non esiste una piattaforma o un iter burocratico che lo consenta</a:t>
+            </a:r>
+          </a:p>
+          <a:p>
+            <a:pPr lvl="1"/>
+            <a:r>
+              <a:rPr lang="it-IT" dirty="0"/>
+              <a:t>Ciò è in contraddizione con gli obbiettivi di gestione efficace delle emergenze, in quanto avere già una lista di immobili utilizzabili immediatamente potrebbe portare a saltare interamente la fase di smistamento in tendopoli e a ridurre il numero di persone costrette a risiedere in hotel per tempi prolungati</a:t>
+            </a:r>
+          </a:p>
+          <a:p>
+            <a:pPr lvl="1"/>
+            <a:endParaRPr lang="it-IT" dirty="0"/>
+          </a:p>
+          <a:p>
+            <a:pPr lvl="1"/>
+            <a:endParaRPr lang="it-IT" dirty="0"/>
+          </a:p>
+          <a:p>
+            <a:pPr lvl="1"/>
+            <a:endParaRPr lang="it-IT" dirty="0"/>
+          </a:p>
+        </p:txBody>
+      </p:sp>
+    </p:spTree>
+    <p:extLst>
+      <p:ext uri="{BB962C8B-B14F-4D97-AF65-F5344CB8AC3E}">
+        <p14:creationId xmlns:p14="http://schemas.microsoft.com/office/powerpoint/2010/main" val="1369120281"/>
+      </p:ext>
+    </p:extLst>
+  </p:cSld>
+  <p:clrMapOvr>
+    <a:masterClrMapping/>
+  </p:clrMapOvr>
+</p:sld>
+</file>
+
+<file path=ppt/slides/slide6.xml><?xml version="1.0" encoding="utf-8"?>
+<p:sld xmlns:a="http://schemas.openxmlformats.org/drawingml/2006/main" xmlns:r="http://schemas.openxmlformats.org/officeDocument/2006/relationships" xmlns:p="http://schemas.openxmlformats.org/presentationml/2006/main">
+  <p:cSld>
+    <p:spTree>
+      <p:nvGrpSpPr>
+        <p:cNvPr id="1" name=""/>
+        <p:cNvGrpSpPr/>
+        <p:nvPr/>
+      </p:nvGrpSpPr>
+      <p:grpSpPr>
+        <a:xfrm>
+          <a:off x="0" y="0"/>
+          <a:ext cx="0" cy="0"/>
+          <a:chOff x="0" y="0"/>
+          <a:chExt cx="0" cy="0"/>
+        </a:xfrm>
+      </p:grpSpPr>
+      <p:sp>
+        <p:nvSpPr>
+          <p:cNvPr id="2" name="Titolo 1">
+            <a:extLst>
+              <a:ext uri="{FF2B5EF4-FFF2-40B4-BE49-F238E27FC236}">
+                <a16:creationId xmlns:a16="http://schemas.microsoft.com/office/drawing/2014/main" id="{503931D8-D0CD-F34D-A8E4-4DBAF1645F4F}"/>
+              </a:ext>
+            </a:extLst>
+          </p:cNvPr>
+          <p:cNvSpPr>
+            <a:spLocks noGrp="1"/>
+          </p:cNvSpPr>
+          <p:nvPr>
+            <p:ph type="title"/>
+          </p:nvPr>
+        </p:nvSpPr>
+        <p:spPr/>
+        <p:style>
+          <a:lnRef idx="2">
+            <a:schemeClr val="accent2">
+              <a:shade val="50000"/>
+            </a:schemeClr>
+          </a:lnRef>
+          <a:fillRef idx="1">
+            <a:schemeClr val="accent2"/>
+          </a:fillRef>
+          <a:effectRef idx="0">
+            <a:schemeClr val="accent2"/>
+          </a:effectRef>
+          <a:fontRef idx="minor">
+            <a:schemeClr val="lt1"/>
+          </a:fontRef>
+        </p:style>
+        <p:txBody>
+          <a:bodyPr/>
+          <a:lstStyle/>
+          <a:p>
+            <a:r>
+              <a:rPr lang="it-IT" dirty="0"/>
+              <a:t>Soluzione Proposta</a:t>
+            </a:r>
+          </a:p>
+        </p:txBody>
+      </p:sp>
+      <p:sp>
+        <p:nvSpPr>
+          <p:cNvPr id="6" name="Segnaposto contenuto 5">
+            <a:extLst>
+              <a:ext uri="{FF2B5EF4-FFF2-40B4-BE49-F238E27FC236}">
+                <a16:creationId xmlns:a16="http://schemas.microsoft.com/office/drawing/2014/main" id="{050B5B15-5721-8D42-B792-B940345657C9}"/>
+              </a:ext>
+            </a:extLst>
+          </p:cNvPr>
+          <p:cNvSpPr>
+            <a:spLocks noGrp="1"/>
+          </p:cNvSpPr>
+          <p:nvPr>
+            <p:ph idx="1"/>
+          </p:nvPr>
+        </p:nvSpPr>
+        <p:spPr/>
+        <p:txBody>
+          <a:bodyPr>
+            <a:normAutofit fontScale="92500" lnSpcReduction="10000"/>
+          </a:bodyPr>
+          <a:lstStyle/>
+          <a:p>
+            <a:r>
+              <a:rPr lang="it-IT" dirty="0" err="1"/>
+              <a:t>ShareMyHouse</a:t>
+            </a:r>
+            <a:r>
+              <a:rPr lang="it-IT" dirty="0"/>
+              <a:t> si propone di creare un sistema integrato che consenta ai cittadini che hanno seconde case di metterle a disposizione della Protezione Civile, al fine di consentire una redistribuzione rapida ed efficiente della popolazione colpita da catastrofi naturali o di altro tipo. </a:t>
+            </a:r>
+          </a:p>
+          <a:p>
+            <a:r>
+              <a:rPr lang="it-IT" dirty="0"/>
+              <a:t>Allo stesso tempo, ci si propone di fornire alla Protezione Civile un mezzo rapido per individuare ed assegnare facilmente gli immobili più adatti ai cittadini che ne hanno bisogno in quel momento, in base a criteri tra cui quello geografico e bisogno di case con caratteristiche particolari (Es: Accesso facilitato per carrozzine) </a:t>
+            </a:r>
+          </a:p>
+          <a:p>
+            <a:pPr marL="0" indent="0">
+              <a:buNone/>
+            </a:pPr>
+            <a:endParaRPr lang="it-IT" dirty="0"/>
+          </a:p>
+          <a:p>
+            <a:endParaRPr lang="it-IT" dirty="0"/>
+          </a:p>
+        </p:txBody>
+      </p:sp>
+    </p:spTree>
+    <p:extLst>
+      <p:ext uri="{BB962C8B-B14F-4D97-AF65-F5344CB8AC3E}">
+        <p14:creationId xmlns:p14="http://schemas.microsoft.com/office/powerpoint/2010/main" val="1375739231"/>
+      </p:ext>
+    </p:extLst>
+  </p:cSld>
+  <p:clrMapOvr>
+    <a:masterClrMapping/>
+  </p:clrMapOvr>
+</p:sld>
+</file>
+
+<file path=ppt/slides/slide7.xml><?xml version="1.0" encoding="utf-8"?>
+<p:sld xmlns:a="http://schemas.openxmlformats.org/drawingml/2006/main" xmlns:r="http://schemas.openxmlformats.org/officeDocument/2006/relationships" xmlns:p="http://schemas.openxmlformats.org/presentationml/2006/main">
+  <p:cSld>
+    <p:spTree>
+      <p:nvGrpSpPr>
+        <p:cNvPr id="1" name=""/>
+        <p:cNvGrpSpPr/>
+        <p:nvPr/>
+      </p:nvGrpSpPr>
+      <p:grpSpPr>
+        <a:xfrm>
+          <a:off x="0" y="0"/>
+          <a:ext cx="0" cy="0"/>
+          <a:chOff x="0" y="0"/>
+          <a:chExt cx="0" cy="0"/>
+        </a:xfrm>
+      </p:grpSpPr>
+      <p:sp>
+        <p:nvSpPr>
+          <p:cNvPr id="2" name="Titolo 1">
+            <a:extLst>
+              <a:ext uri="{FF2B5EF4-FFF2-40B4-BE49-F238E27FC236}">
+                <a16:creationId xmlns:a16="http://schemas.microsoft.com/office/drawing/2014/main" id="{503931D8-D0CD-F34D-A8E4-4DBAF1645F4F}"/>
+              </a:ext>
+            </a:extLst>
+          </p:cNvPr>
+          <p:cNvSpPr>
+            <a:spLocks noGrp="1"/>
+          </p:cNvSpPr>
+          <p:nvPr>
+            <p:ph type="title"/>
+          </p:nvPr>
+        </p:nvSpPr>
+        <p:spPr/>
+        <p:style>
+          <a:lnRef idx="2">
+            <a:schemeClr val="accent2">
+              <a:shade val="50000"/>
+            </a:schemeClr>
+          </a:lnRef>
+          <a:fillRef idx="1">
+            <a:schemeClr val="accent2"/>
+          </a:fillRef>
+          <a:effectRef idx="0">
+            <a:schemeClr val="accent2"/>
+          </a:effectRef>
+          <a:fontRef idx="minor">
+            <a:schemeClr val="lt1"/>
+          </a:fontRef>
+        </p:style>
+        <p:txBody>
+          <a:bodyPr/>
+          <a:lstStyle/>
+          <a:p>
+            <a:r>
+              <a:rPr lang="it-IT" dirty="0"/>
+              <a:t>Utenti Target</a:t>
+            </a:r>
+          </a:p>
+        </p:txBody>
+      </p:sp>
+      <p:sp>
+        <p:nvSpPr>
+          <p:cNvPr id="6" name="Segnaposto contenuto 5">
+            <a:extLst>
+              <a:ext uri="{FF2B5EF4-FFF2-40B4-BE49-F238E27FC236}">
+                <a16:creationId xmlns:a16="http://schemas.microsoft.com/office/drawing/2014/main" id="{050B5B15-5721-8D42-B792-B940345657C9}"/>
+              </a:ext>
+            </a:extLst>
+          </p:cNvPr>
+          <p:cNvSpPr>
+            <a:spLocks noGrp="1"/>
+          </p:cNvSpPr>
+          <p:nvPr>
+            <p:ph idx="1"/>
+          </p:nvPr>
+        </p:nvSpPr>
+        <p:spPr/>
+        <p:txBody>
+          <a:bodyPr>
+            <a:normAutofit lnSpcReduction="10000"/>
+          </a:bodyPr>
+          <a:lstStyle/>
+          <a:p>
+            <a:pPr marL="0" indent="0">
+              <a:buNone/>
+            </a:pPr>
+            <a:r>
+              <a:rPr lang="it-IT" dirty="0"/>
+              <a:t>Gli utenti target saranno persone appartenenti alle seguenti categorie</a:t>
+            </a:r>
+          </a:p>
+          <a:p>
+            <a:r>
+              <a:rPr lang="it-IT" dirty="0"/>
+              <a:t>Cittadini che vogliono mettere a disposizione dei propri immobili che non usano frequentemente</a:t>
+            </a:r>
+          </a:p>
+          <a:p>
+            <a:r>
+              <a:rPr lang="it-IT" dirty="0"/>
+              <a:t>Operatori della Protezione Civile che hanno la necessità di assegnare, in modo rapido, la migliore soluzione temporanea possibile a chi ne ha bisogno</a:t>
+            </a:r>
+          </a:p>
+          <a:p>
+            <a:r>
+              <a:rPr lang="it-IT" dirty="0"/>
+              <a:t>Cittadini che a causa di un evento catastrofico (terremoti, alluvioni crollo di edifici) sono costretti a lasciare, temporaneamente o definitivamente, la propria abitazione</a:t>
+            </a:r>
+          </a:p>
+          <a:p>
+            <a:endParaRPr lang="it-IT" dirty="0"/>
+          </a:p>
+        </p:txBody>
+      </p:sp>
+    </p:spTree>
+    <p:extLst>
+      <p:ext uri="{BB962C8B-B14F-4D97-AF65-F5344CB8AC3E}">
+        <p14:creationId xmlns:p14="http://schemas.microsoft.com/office/powerpoint/2010/main" val="4101256837"/>
+      </p:ext>
+    </p:extLst>
+  </p:cSld>
+  <p:clrMapOvr>
+    <a:masterClrMapping/>
+  </p:clrMapOvr>
+</p:sld>
+</file>
+
+<file path=ppt/slides/slide8.xml><?xml version="1.0" encoding="utf-8"?>
+<p:sld xmlns:a="http://schemas.openxmlformats.org/drawingml/2006/main" xmlns:r="http://schemas.openxmlformats.org/officeDocument/2006/relationships" xmlns:p="http://schemas.openxmlformats.org/presentationml/2006/main">
+  <p:cSld>
+    <p:spTree>
+      <p:nvGrpSpPr>
+        <p:cNvPr id="1" name=""/>
+        <p:cNvGrpSpPr/>
+        <p:nvPr/>
+      </p:nvGrpSpPr>
+      <p:grpSpPr>
+        <a:xfrm>
+          <a:off x="0" y="0"/>
+          <a:ext cx="0" cy="0"/>
+          <a:chOff x="0" y="0"/>
+          <a:chExt cx="0" cy="0"/>
+        </a:xfrm>
+      </p:grpSpPr>
+      <p:sp>
+        <p:nvSpPr>
+          <p:cNvPr id="2" name="Titolo 1">
+            <a:extLst>
+              <a:ext uri="{FF2B5EF4-FFF2-40B4-BE49-F238E27FC236}">
+                <a16:creationId xmlns:a16="http://schemas.microsoft.com/office/drawing/2014/main" id="{503931D8-D0CD-F34D-A8E4-4DBAF1645F4F}"/>
+              </a:ext>
+            </a:extLst>
+          </p:cNvPr>
+          <p:cNvSpPr>
+            <a:spLocks noGrp="1"/>
+          </p:cNvSpPr>
+          <p:nvPr>
+            <p:ph type="title"/>
+          </p:nvPr>
+        </p:nvSpPr>
+        <p:spPr/>
+        <p:style>
+          <a:lnRef idx="2">
+            <a:schemeClr val="accent2">
+              <a:shade val="50000"/>
+            </a:schemeClr>
+          </a:lnRef>
+          <a:fillRef idx="1">
+            <a:schemeClr val="accent2"/>
+          </a:fillRef>
+          <a:effectRef idx="0">
+            <a:schemeClr val="accent2"/>
+          </a:effectRef>
+          <a:fontRef idx="minor">
+            <a:schemeClr val="lt1"/>
+          </a:fontRef>
+        </p:style>
+        <p:txBody>
+          <a:bodyPr/>
+          <a:lstStyle/>
+          <a:p>
+            <a:r>
+              <a:rPr lang="it-IT" dirty="0"/>
+              <a:t>Indagine Contestuale</a:t>
+            </a:r>
+          </a:p>
+        </p:txBody>
+      </p:sp>
+      <p:sp>
+        <p:nvSpPr>
+          <p:cNvPr id="6" name="Segnaposto contenuto 5">
+            <a:extLst>
+              <a:ext uri="{FF2B5EF4-FFF2-40B4-BE49-F238E27FC236}">
+                <a16:creationId xmlns:a16="http://schemas.microsoft.com/office/drawing/2014/main" id="{050B5B15-5721-8D42-B792-B940345657C9}"/>
+              </a:ext>
+            </a:extLst>
+          </p:cNvPr>
+          <p:cNvSpPr>
+            <a:spLocks noGrp="1"/>
+          </p:cNvSpPr>
+          <p:nvPr>
+            <p:ph idx="1"/>
+          </p:nvPr>
+        </p:nvSpPr>
+        <p:spPr/>
+        <p:txBody>
+          <a:bodyPr>
+            <a:normAutofit fontScale="85000" lnSpcReduction="10000"/>
+          </a:bodyPr>
+          <a:lstStyle/>
+          <a:p>
+            <a:pPr marL="0" indent="0">
+              <a:buNone/>
+            </a:pPr>
+            <a:r>
+              <a:rPr lang="it-IT" dirty="0"/>
+              <a:t>La prima operazione svolta è stata lo svolgimento di un’analisi contestuale. </a:t>
+            </a:r>
+          </a:p>
+          <a:p>
+            <a:r>
+              <a:rPr lang="it-IT" dirty="0"/>
+              <a:t>Come mezzo primario di raccolta di informazioni, sono state utilizzate le interviste, portate avanti con persone facenti parte dei target precedentemente individuati. </a:t>
+            </a:r>
+          </a:p>
+          <a:p>
+            <a:pPr lvl="1"/>
+            <a:r>
+              <a:rPr lang="it-IT" dirty="0"/>
+              <a:t>Di particolare importanza è stata l’intervista con l’ing. Michele Grimaldi, che ci ha potuto spiegare nel dettaglio come vengono gestite attualmente le fasi iniziali di censimento e redistribuzione in tendopoli/immobili temporanei</a:t>
+            </a:r>
+          </a:p>
+          <a:p>
+            <a:pPr marL="457200" lvl="1" indent="0">
+              <a:buNone/>
+            </a:pPr>
+            <a:endParaRPr lang="it-IT" dirty="0"/>
+          </a:p>
+          <a:p>
+            <a:r>
+              <a:rPr lang="it-IT" dirty="0"/>
+              <a:t>Successivamente, per ottenere dati da una popolazione più ampia, è stato creato un sondaggio con Google Moduli ed è stato distribuito online, rendendolo compilabile liberamente da chiunque desiderasse contribuire</a:t>
+            </a:r>
+          </a:p>
+        </p:txBody>
+      </p:sp>
+    </p:spTree>
+    <p:extLst>
+      <p:ext uri="{BB962C8B-B14F-4D97-AF65-F5344CB8AC3E}">
+        <p14:creationId xmlns:p14="http://schemas.microsoft.com/office/powerpoint/2010/main" val="1443274396"/>
+      </p:ext>
+    </p:extLst>
+  </p:cSld>
+  <p:clrMapOvr>
+    <a:masterClrMapping/>
+  </p:clrMapOvr>
+</p:sld>
+</file>
+
+<file path=ppt/slides/slide9.xml><?xml version="1.0" encoding="utf-8"?>
+<p:sld xmlns:a="http://schemas.openxmlformats.org/drawingml/2006/main" xmlns:r="http://schemas.openxmlformats.org/officeDocument/2006/relationships" xmlns:p="http://schemas.openxmlformats.org/presentationml/2006/main">
+  <p:cSld>
+    <p:spTree>
+      <p:nvGrpSpPr>
+        <p:cNvPr id="1" name=""/>
+        <p:cNvGrpSpPr/>
+        <p:nvPr/>
+      </p:nvGrpSpPr>
+      <p:grpSpPr>
+        <a:xfrm>
+          <a:off x="0" y="0"/>
+          <a:ext cx="0" cy="0"/>
+          <a:chOff x="0" y="0"/>
+          <a:chExt cx="0" cy="0"/>
+        </a:xfrm>
+      </p:grpSpPr>
+      <p:sp>
+        <p:nvSpPr>
+          <p:cNvPr id="2" name="Titolo 1">
+            <a:extLst>
+              <a:ext uri="{FF2B5EF4-FFF2-40B4-BE49-F238E27FC236}">
+                <a16:creationId xmlns:a16="http://schemas.microsoft.com/office/drawing/2014/main" id="{503931D8-D0CD-F34D-A8E4-4DBAF1645F4F}"/>
+              </a:ext>
+            </a:extLst>
+          </p:cNvPr>
+          <p:cNvSpPr>
+            <a:spLocks noGrp="1"/>
+          </p:cNvSpPr>
+          <p:nvPr>
+            <p:ph type="title"/>
+          </p:nvPr>
+        </p:nvSpPr>
+        <p:spPr/>
+        <p:style>
+          <a:lnRef idx="2">
+            <a:schemeClr val="accent2">
+              <a:shade val="50000"/>
+            </a:schemeClr>
+          </a:lnRef>
+          <a:fillRef idx="1">
+            <a:schemeClr val="accent2"/>
+          </a:fillRef>
+          <a:effectRef idx="0">
+            <a:schemeClr val="accent2"/>
+          </a:effectRef>
+          <a:fontRef idx="minor">
+            <a:schemeClr val="lt1"/>
+          </a:fontRef>
+        </p:style>
+        <p:txBody>
+          <a:bodyPr/>
+          <a:lstStyle/>
+          <a:p>
+            <a:r>
+              <a:rPr lang="it-IT" dirty="0"/>
+              <a:t>Indagine Contestuale</a:t>
+            </a:r>
+          </a:p>
+        </p:txBody>
+      </p:sp>
+      <p:sp>
+        <p:nvSpPr>
+          <p:cNvPr id="6" name="Segnaposto contenuto 5">
+            <a:extLst>
+              <a:ext uri="{FF2B5EF4-FFF2-40B4-BE49-F238E27FC236}">
+                <a16:creationId xmlns:a16="http://schemas.microsoft.com/office/drawing/2014/main" id="{050B5B15-5721-8D42-B792-B940345657C9}"/>
+              </a:ext>
+            </a:extLst>
+          </p:cNvPr>
+          <p:cNvSpPr>
+            <a:spLocks noGrp="1"/>
+          </p:cNvSpPr>
+          <p:nvPr>
+            <p:ph idx="1"/>
+          </p:nvPr>
+        </p:nvSpPr>
+        <p:spPr/>
+        <p:txBody>
+          <a:bodyPr>
+            <a:normAutofit lnSpcReduction="10000"/>
+          </a:bodyPr>
+          <a:lstStyle/>
+          <a:p>
+            <a:r>
+              <a:rPr lang="it-IT" dirty="0"/>
+              <a:t>Con l’indagine contestuale abbiamo voluto raccogliere dati relativi alle aspettative che gli utenti potrebbero riporre nel sistema proposto e alla sua utilità realmente percepita.</a:t>
+            </a:r>
+          </a:p>
+          <a:p>
+            <a:r>
+              <a:rPr lang="it-IT" dirty="0"/>
+              <a:t>Un altro punto relativamente al quale abbiamo cercato di ottenere informazioni era il numero di persone che sarebbero state desiderose di mettere a disposizione un proprio immobile, ma che non l’avevano mai fatto perché era stato detto loro che non era possibile o perché temevano un iter burocratico lungo e complesso. </a:t>
+            </a:r>
+          </a:p>
+          <a:p>
+            <a:pPr marL="0" indent="0">
+              <a:buNone/>
+            </a:pPr>
+            <a:endParaRPr lang="it-IT" dirty="0"/>
+          </a:p>
+        </p:txBody>
+      </p:sp>
+    </p:spTree>
+    <p:extLst>
+      <p:ext uri="{BB962C8B-B14F-4D97-AF65-F5344CB8AC3E}">
+        <p14:creationId xmlns:p14="http://schemas.microsoft.com/office/powerpoint/2010/main" val="39787510"/>
       </p:ext>
     </p:extLst>
   </p:cSld>
@@ -4037,4 +7675,299 @@
     </a:ext>
   </a:extLst>
 </a:theme>
+</file>
+
+<file path=ppt/theme/theme2.xml><?xml version="1.0" encoding="utf-8"?>
+<a:theme xmlns:a="http://schemas.openxmlformats.org/drawingml/2006/main" name="Tema di Office">
+  <a:themeElements>
+    <a:clrScheme name="Office">
+      <a:dk1>
+        <a:sysClr val="windowText" lastClr="000000"/>
+      </a:dk1>
+      <a:lt1>
+        <a:sysClr val="window" lastClr="FFFFFF"/>
+      </a:lt1>
+      <a:dk2>
+        <a:srgbClr val="44546A"/>
+      </a:dk2>
+      <a:lt2>
+        <a:srgbClr val="E7E6E6"/>
+      </a:lt2>
+      <a:accent1>
+        <a:srgbClr val="4472C4"/>
+      </a:accent1>
+      <a:accent2>
+        <a:srgbClr val="ED7D31"/>
+      </a:accent2>
+      <a:accent3>
+        <a:srgbClr val="A5A5A5"/>
+      </a:accent3>
+      <a:accent4>
+        <a:srgbClr val="FFC000"/>
+      </a:accent4>
+      <a:accent5>
+        <a:srgbClr val="5B9BD5"/>
+      </a:accent5>
+      <a:accent6>
+        <a:srgbClr val="70AD47"/>
+      </a:accent6>
+      <a:hlink>
+        <a:srgbClr val="0563C1"/>
+      </a:hlink>
+      <a:folHlink>
+        <a:srgbClr val="954F72"/>
+      </a:folHlink>
+    </a:clrScheme>
+    <a:fontScheme name="Office">
+      <a:majorFont>
+        <a:latin typeface="Calibri Light" panose="020F0302020204030204"/>
+        <a:ea typeface=""/>
+        <a:cs typeface=""/>
+        <a:font script="Jpan" typeface="游ゴシック Light"/>
+        <a:font script="Hang" typeface="맑은 고딕"/>
+        <a:font script="Hans" typeface="等线 Light"/>
+        <a:font script="Hant" typeface="新細明體"/>
+        <a:font script="Arab" typeface="Times New Roman"/>
+        <a:font script="Hebr" typeface="Times New Roman"/>
+        <a:font script="Thai" typeface="Angsana New"/>
+        <a:font script="Ethi" typeface="Nyala"/>
+        <a:font script="Beng" typeface="Vrinda"/>
+        <a:font script="Gujr" typeface="Shruti"/>
+        <a:font script="Khmr" typeface="MoolBoran"/>
+        <a:font script="Knda" typeface="Tunga"/>
+        <a:font script="Guru" typeface="Raavi"/>
+        <a:font script="Cans" typeface="Euphemia"/>
+        <a:font script="Cher" typeface="Plantagenet Cherokee"/>
+        <a:font script="Yiii" typeface="Microsoft Yi Baiti"/>
+        <a:font script="Tibt" typeface="Microsoft Himalaya"/>
+        <a:font script="Thaa" typeface="MV Boli"/>
+        <a:font script="Deva" typeface="Mangal"/>
+        <a:font script="Telu" typeface="Gautami"/>
+        <a:font script="Taml" typeface="Latha"/>
+        <a:font script="Syrc" typeface="Estrangelo Edessa"/>
+        <a:font script="Orya" typeface="Kalinga"/>
+        <a:font script="Mlym" typeface="Kartika"/>
+        <a:font script="Laoo" typeface="DokChampa"/>
+        <a:font script="Sinh" typeface="Iskoola Pota"/>
+        <a:font script="Mong" typeface="Mongolian Baiti"/>
+        <a:font script="Viet" typeface="Times New Roman"/>
+        <a:font script="Uigh" typeface="Microsoft Uighur"/>
+        <a:font script="Geor" typeface="Sylfaen"/>
+        <a:font script="Armn" typeface="Arial"/>
+        <a:font script="Bugi" typeface="Leelawadee UI"/>
+        <a:font script="Bopo" typeface="Microsoft JhengHei"/>
+        <a:font script="Java" typeface="Javanese Text"/>
+        <a:font script="Lisu" typeface="Segoe UI"/>
+        <a:font script="Mymr" typeface="Myanmar Text"/>
+        <a:font script="Nkoo" typeface="Ebrima"/>
+        <a:font script="Olck" typeface="Nirmala UI"/>
+        <a:font script="Osma" typeface="Ebrima"/>
+        <a:font script="Phag" typeface="Phagspa"/>
+        <a:font script="Syrn" typeface="Estrangelo Edessa"/>
+        <a:font script="Syrj" typeface="Estrangelo Edessa"/>
+        <a:font script="Syre" typeface="Estrangelo Edessa"/>
+        <a:font script="Sora" typeface="Nirmala UI"/>
+        <a:font script="Tale" typeface="Microsoft Tai Le"/>
+        <a:font script="Talu" typeface="Microsoft New Tai Lue"/>
+        <a:font script="Tfng" typeface="Ebrima"/>
+      </a:majorFont>
+      <a:minorFont>
+        <a:latin typeface="Calibri" panose="020F0502020204030204"/>
+        <a:ea typeface=""/>
+        <a:cs typeface=""/>
+        <a:font script="Jpan" typeface="游ゴシック"/>
+        <a:font script="Hang" typeface="맑은 고딕"/>
+        <a:font script="Hans" typeface="等线"/>
+        <a:font script="Hant" typeface="新細明體"/>
+        <a:font script="Arab" typeface="Arial"/>
+        <a:font script="Hebr" typeface="Arial"/>
+        <a:font script="Thai" typeface="Cordia New"/>
+        <a:font script="Ethi" typeface="Nyala"/>
+        <a:font script="Beng" typeface="Vrinda"/>
+        <a:font script="Gujr" typeface="Shruti"/>
+        <a:font script="Khmr" typeface="DaunPenh"/>
+        <a:font script="Knda" typeface="Tunga"/>
+        <a:font script="Guru" typeface="Raavi"/>
+        <a:font script="Cans" typeface="Euphemia"/>
+        <a:font script="Cher" typeface="Plantagenet Cherokee"/>
+        <a:font script="Yiii" typeface="Microsoft Yi Baiti"/>
+        <a:font script="Tibt" typeface="Microsoft Himalaya"/>
+        <a:font script="Thaa" typeface="MV Boli"/>
+        <a:font script="Deva" typeface="Mangal"/>
+        <a:font script="Telu" typeface="Gautami"/>
+        <a:font script="Taml" typeface="Latha"/>
+        <a:font script="Syrc" typeface="Estrangelo Edessa"/>
+        <a:font script="Orya" typeface="Kalinga"/>
+        <a:font script="Mlym" typeface="Kartika"/>
+        <a:font script="Laoo" typeface="DokChampa"/>
+        <a:font script="Sinh" typeface="Iskoola Pota"/>
+        <a:font script="Mong" typeface="Mongolian Baiti"/>
+        <a:font script="Viet" typeface="Arial"/>
+        <a:font script="Uigh" typeface="Microsoft Uighur"/>
+        <a:font script="Geor" typeface="Sylfaen"/>
+        <a:font script="Armn" typeface="Arial"/>
+        <a:font script="Bugi" typeface="Leelawadee UI"/>
+        <a:font script="Bopo" typeface="Microsoft JhengHei"/>
+        <a:font script="Java" typeface="Javanese Text"/>
+        <a:font script="Lisu" typeface="Segoe UI"/>
+        <a:font script="Mymr" typeface="Myanmar Text"/>
+        <a:font script="Nkoo" typeface="Ebrima"/>
+        <a:font script="Olck" typeface="Nirmala UI"/>
+        <a:font script="Osma" typeface="Ebrima"/>
+        <a:font script="Phag" typeface="Phagspa"/>
+        <a:font script="Syrn" typeface="Estrangelo Edessa"/>
+        <a:font script="Syrj" typeface="Estrangelo Edessa"/>
+        <a:font script="Syre" typeface="Estrangelo Edessa"/>
+        <a:font script="Sora" typeface="Nirmala UI"/>
+        <a:font script="Tale" typeface="Microsoft Tai Le"/>
+        <a:font script="Talu" typeface="Microsoft New Tai Lue"/>
+        <a:font script="Tfng" typeface="Ebrima"/>
+      </a:minorFont>
+    </a:fontScheme>
+    <a:fmtScheme name="Office">
+      <a:fillStyleLst>
+        <a:solidFill>
+          <a:schemeClr val="phClr"/>
+        </a:solidFill>
+        <a:gradFill rotWithShape="1">
+          <a:gsLst>
+            <a:gs pos="0">
+              <a:schemeClr val="phClr">
+                <a:lumMod val="110000"/>
+                <a:satMod val="105000"/>
+                <a:tint val="67000"/>
+              </a:schemeClr>
+            </a:gs>
+            <a:gs pos="50000">
+              <a:schemeClr val="phClr">
+                <a:lumMod val="105000"/>
+                <a:satMod val="103000"/>
+                <a:tint val="73000"/>
+              </a:schemeClr>
+            </a:gs>
+            <a:gs pos="100000">
+              <a:schemeClr val="phClr">
+                <a:lumMod val="105000"/>
+                <a:satMod val="109000"/>
+                <a:tint val="81000"/>
+              </a:schemeClr>
+            </a:gs>
+          </a:gsLst>
+          <a:lin ang="5400000" scaled="0"/>
+        </a:gradFill>
+        <a:gradFill rotWithShape="1">
+          <a:gsLst>
+            <a:gs pos="0">
+              <a:schemeClr val="phClr">
+                <a:satMod val="103000"/>
+                <a:lumMod val="102000"/>
+                <a:tint val="94000"/>
+              </a:schemeClr>
+            </a:gs>
+            <a:gs pos="50000">
+              <a:schemeClr val="phClr">
+                <a:satMod val="110000"/>
+                <a:lumMod val="100000"/>
+                <a:shade val="100000"/>
+              </a:schemeClr>
+            </a:gs>
+            <a:gs pos="100000">
+              <a:schemeClr val="phClr">
+                <a:lumMod val="99000"/>
+                <a:satMod val="120000"/>
+                <a:shade val="78000"/>
+              </a:schemeClr>
+            </a:gs>
+          </a:gsLst>
+          <a:lin ang="5400000" scaled="0"/>
+        </a:gradFill>
+      </a:fillStyleLst>
+      <a:lnStyleLst>
+        <a:ln w="6350" cap="flat" cmpd="sng" algn="ctr">
+          <a:solidFill>
+            <a:schemeClr val="phClr"/>
+          </a:solidFill>
+          <a:prstDash val="solid"/>
+          <a:miter lim="800000"/>
+        </a:ln>
+        <a:ln w="12700" cap="flat" cmpd="sng" algn="ctr">
+          <a:solidFill>
+            <a:schemeClr val="phClr"/>
+          </a:solidFill>
+          <a:prstDash val="solid"/>
+          <a:miter lim="800000"/>
+        </a:ln>
+        <a:ln w="19050" cap="flat" cmpd="sng" algn="ctr">
+          <a:solidFill>
+            <a:schemeClr val="phClr"/>
+          </a:solidFill>
+          <a:prstDash val="solid"/>
+          <a:miter lim="800000"/>
+        </a:ln>
+      </a:lnStyleLst>
+      <a:effectStyleLst>
+        <a:effectStyle>
+          <a:effectLst/>
+        </a:effectStyle>
+        <a:effectStyle>
+          <a:effectLst/>
+        </a:effectStyle>
+        <a:effectStyle>
+          <a:effectLst>
+            <a:outerShdw blurRad="57150" dist="19050" dir="5400000" algn="ctr" rotWithShape="0">
+              <a:srgbClr val="000000">
+                <a:alpha val="63000"/>
+              </a:srgbClr>
+            </a:outerShdw>
+          </a:effectLst>
+        </a:effectStyle>
+      </a:effectStyleLst>
+      <a:bgFillStyleLst>
+        <a:solidFill>
+          <a:schemeClr val="phClr"/>
+        </a:solidFill>
+        <a:solidFill>
+          <a:schemeClr val="phClr">
+            <a:tint val="95000"/>
+            <a:satMod val="170000"/>
+          </a:schemeClr>
+        </a:solidFill>
+        <a:gradFill rotWithShape="1">
+          <a:gsLst>
+            <a:gs pos="0">
+              <a:schemeClr val="phClr">
+                <a:tint val="93000"/>
+                <a:satMod val="150000"/>
+                <a:shade val="98000"/>
+                <a:lumMod val="102000"/>
+              </a:schemeClr>
+            </a:gs>
+            <a:gs pos="50000">
+              <a:schemeClr val="phClr">
+                <a:tint val="98000"/>
+                <a:satMod val="130000"/>
+                <a:shade val="90000"/>
+                <a:lumMod val="103000"/>
+              </a:schemeClr>
+            </a:gs>
+            <a:gs pos="100000">
+              <a:schemeClr val="phClr">
+                <a:shade val="63000"/>
+                <a:satMod val="120000"/>
+              </a:schemeClr>
+            </a:gs>
+          </a:gsLst>
+          <a:lin ang="5400000" scaled="0"/>
+        </a:gradFill>
+      </a:bgFillStyleLst>
+    </a:fmtScheme>
+  </a:themeElements>
+  <a:objectDefaults/>
+  <a:extraClrSchemeLst/>
+  <a:extLst>
+    <a:ext uri="{05A4C25C-085E-4340-85A3-A5531E510DB2}">
+      <thm15:themeFamily xmlns:thm15="http://schemas.microsoft.com/office/thememl/2012/main" name="Office Theme" id="{62F939B6-93AF-4DB8-9C6B-D6C7DFDC589F}" vid="{4A3C46E8-61CC-4603-A589-7422A47A8E4A}"/>
+    </a:ext>
+  </a:extLst>
+</a:theme>
 </file>
</xml_diff>